<commit_message>
Adding insurance datasets for QA
</commit_message>
<xml_diff>
--- a/Insurance_Bot_Presentation.pptx
+++ b/Insurance_Bot_Presentation.pptx
@@ -11,20 +11,21 @@
     <p:sldId id="276" r:id="rId5"/>
     <p:sldId id="260" r:id="rId6"/>
     <p:sldId id="257" r:id="rId7"/>
-    <p:sldId id="268" r:id="rId8"/>
-    <p:sldId id="265" r:id="rId9"/>
-    <p:sldId id="262" r:id="rId10"/>
-    <p:sldId id="261" r:id="rId11"/>
-    <p:sldId id="277" r:id="rId12"/>
-    <p:sldId id="258" r:id="rId13"/>
-    <p:sldId id="259" r:id="rId14"/>
-    <p:sldId id="266" r:id="rId15"/>
-    <p:sldId id="267" r:id="rId16"/>
-    <p:sldId id="270" r:id="rId17"/>
-    <p:sldId id="278" r:id="rId18"/>
-    <p:sldId id="274" r:id="rId19"/>
-    <p:sldId id="264" r:id="rId20"/>
-    <p:sldId id="269" r:id="rId21"/>
+    <p:sldId id="279" r:id="rId8"/>
+    <p:sldId id="268" r:id="rId9"/>
+    <p:sldId id="265" r:id="rId10"/>
+    <p:sldId id="262" r:id="rId11"/>
+    <p:sldId id="261" r:id="rId12"/>
+    <p:sldId id="277" r:id="rId13"/>
+    <p:sldId id="258" r:id="rId14"/>
+    <p:sldId id="259" r:id="rId15"/>
+    <p:sldId id="266" r:id="rId16"/>
+    <p:sldId id="267" r:id="rId17"/>
+    <p:sldId id="270" r:id="rId18"/>
+    <p:sldId id="278" r:id="rId19"/>
+    <p:sldId id="274" r:id="rId20"/>
+    <p:sldId id="264" r:id="rId21"/>
+    <p:sldId id="269" r:id="rId22"/>
   </p:sldIdLst>
   <p:sldSz cx="12192000" cy="6858000"/>
   <p:notesSz cx="6858000" cy="9144000"/>
@@ -181,7 +182,7 @@
           <a:noFill/>
           <a:extLst>
             <a:ext uri="{909E8E84-426E-40dd-AFC4-6F175D3DCCD1}">
-              <a14:hiddenFill xmlns:a14="http://schemas.microsoft.com/office/drawing/2010/main" xmlns="">
+              <a14:hiddenFill xmlns="" xmlns:a14="http://schemas.microsoft.com/office/drawing/2010/main">
                 <a:solidFill>
                   <a:srgbClr val="FFFFFF"/>
                 </a:solidFill>
@@ -241,7 +242,7 @@
             </a:ln>
             <a:extLst>
               <a:ext uri="{91240B29-F687-4f45-9708-019B960494DF}">
-                <a14:hiddenLine xmlns:a14="http://schemas.microsoft.com/office/drawing/2010/main" xmlns="" w="9525">
+                <a14:hiddenLine xmlns="" xmlns:a14="http://schemas.microsoft.com/office/drawing/2010/main" w="9525">
                   <a:solidFill>
                     <a:srgbClr val="000000"/>
                   </a:solidFill>
@@ -331,7 +332,7 @@
             </a:ln>
             <a:extLst>
               <a:ext uri="{91240B29-F687-4f45-9708-019B960494DF}">
-                <a14:hiddenLine xmlns:a14="http://schemas.microsoft.com/office/drawing/2010/main" xmlns="" w="9525">
+                <a14:hiddenLine xmlns="" xmlns:a14="http://schemas.microsoft.com/office/drawing/2010/main" w="9525">
                   <a:solidFill>
                     <a:srgbClr val="000000"/>
                   </a:solidFill>
@@ -421,7 +422,7 @@
             </a:ln>
             <a:extLst>
               <a:ext uri="{91240B29-F687-4f45-9708-019B960494DF}">
-                <a14:hiddenLine xmlns:a14="http://schemas.microsoft.com/office/drawing/2010/main" xmlns="" w="9525">
+                <a14:hiddenLine xmlns="" xmlns:a14="http://schemas.microsoft.com/office/drawing/2010/main" w="9525">
                   <a:solidFill>
                     <a:srgbClr val="000000"/>
                   </a:solidFill>
@@ -455,7 +456,7 @@
             </a:ln>
             <a:extLst>
               <a:ext uri="{91240B29-F687-4f45-9708-019B960494DF}">
-                <a14:hiddenLine xmlns:a14="http://schemas.microsoft.com/office/drawing/2010/main" xmlns="" w="9525">
+                <a14:hiddenLine xmlns="" xmlns:a14="http://schemas.microsoft.com/office/drawing/2010/main" w="9525">
                   <a:solidFill>
                     <a:srgbClr val="000000"/>
                   </a:solidFill>
@@ -545,7 +546,7 @@
             </a:ln>
             <a:extLst>
               <a:ext uri="{91240B29-F687-4f45-9708-019B960494DF}">
-                <a14:hiddenLine xmlns:a14="http://schemas.microsoft.com/office/drawing/2010/main" xmlns="" w="9525">
+                <a14:hiddenLine xmlns="" xmlns:a14="http://schemas.microsoft.com/office/drawing/2010/main" w="9525">
                   <a:solidFill>
                     <a:srgbClr val="000000"/>
                   </a:solidFill>
@@ -607,7 +608,7 @@
             </a:ln>
             <a:extLst>
               <a:ext uri="{91240B29-F687-4f45-9708-019B960494DF}">
-                <a14:hiddenLine xmlns:a14="http://schemas.microsoft.com/office/drawing/2010/main" xmlns="" w="9525">
+                <a14:hiddenLine xmlns="" xmlns:a14="http://schemas.microsoft.com/office/drawing/2010/main" w="9525">
                   <a:solidFill>
                     <a:srgbClr val="000000"/>
                   </a:solidFill>
@@ -669,7 +670,7 @@
             </a:ln>
             <a:extLst>
               <a:ext uri="{91240B29-F687-4f45-9708-019B960494DF}">
-                <a14:hiddenLine xmlns:a14="http://schemas.microsoft.com/office/drawing/2010/main" xmlns="" w="9525">
+                <a14:hiddenLine xmlns="" xmlns:a14="http://schemas.microsoft.com/office/drawing/2010/main" w="9525">
                   <a:solidFill>
                     <a:srgbClr val="000000"/>
                   </a:solidFill>
@@ -759,7 +760,7 @@
             </a:ln>
             <a:extLst>
               <a:ext uri="{91240B29-F687-4f45-9708-019B960494DF}">
-                <a14:hiddenLine xmlns:a14="http://schemas.microsoft.com/office/drawing/2010/main" xmlns="" w="9525">
+                <a14:hiddenLine xmlns="" xmlns:a14="http://schemas.microsoft.com/office/drawing/2010/main" w="9525">
                   <a:solidFill>
                     <a:srgbClr val="000000"/>
                   </a:solidFill>
@@ -821,7 +822,7 @@
             </a:ln>
             <a:extLst>
               <a:ext uri="{91240B29-F687-4f45-9708-019B960494DF}">
-                <a14:hiddenLine xmlns:a14="http://schemas.microsoft.com/office/drawing/2010/main" xmlns="" w="9525">
+                <a14:hiddenLine xmlns="" xmlns:a14="http://schemas.microsoft.com/office/drawing/2010/main" w="9525">
                   <a:solidFill>
                     <a:srgbClr val="000000"/>
                   </a:solidFill>
@@ -883,7 +884,7 @@
             </a:ln>
             <a:extLst>
               <a:ext uri="{91240B29-F687-4f45-9708-019B960494DF}">
-                <a14:hiddenLine xmlns:a14="http://schemas.microsoft.com/office/drawing/2010/main" xmlns="" w="9525">
+                <a14:hiddenLine xmlns="" xmlns:a14="http://schemas.microsoft.com/office/drawing/2010/main" w="9525">
                   <a:solidFill>
                     <a:srgbClr val="000000"/>
                   </a:solidFill>
@@ -973,7 +974,7 @@
             </a:ln>
             <a:extLst>
               <a:ext uri="{91240B29-F687-4f45-9708-019B960494DF}">
-                <a14:hiddenLine xmlns:a14="http://schemas.microsoft.com/office/drawing/2010/main" xmlns="" w="9525">
+                <a14:hiddenLine xmlns="" xmlns:a14="http://schemas.microsoft.com/office/drawing/2010/main" w="9525">
                   <a:solidFill>
                     <a:srgbClr val="000000"/>
                   </a:solidFill>
@@ -1063,7 +1064,7 @@
             </a:ln>
             <a:extLst>
               <a:ext uri="{91240B29-F687-4f45-9708-019B960494DF}">
-                <a14:hiddenLine xmlns:a14="http://schemas.microsoft.com/office/drawing/2010/main" xmlns="" w="9525">
+                <a14:hiddenLine xmlns="" xmlns:a14="http://schemas.microsoft.com/office/drawing/2010/main" w="9525">
                   <a:solidFill>
                     <a:srgbClr val="000000"/>
                   </a:solidFill>
@@ -1125,7 +1126,7 @@
             </a:ln>
             <a:extLst>
               <a:ext uri="{91240B29-F687-4f45-9708-019B960494DF}">
-                <a14:hiddenLine xmlns:a14="http://schemas.microsoft.com/office/drawing/2010/main" xmlns="" w="9525">
+                <a14:hiddenLine xmlns="" xmlns:a14="http://schemas.microsoft.com/office/drawing/2010/main" w="9525">
                   <a:solidFill>
                     <a:srgbClr val="000000"/>
                   </a:solidFill>
@@ -1235,7 +1236,7 @@
             </a:ln>
             <a:extLst>
               <a:ext uri="{91240B29-F687-4f45-9708-019B960494DF}">
-                <a14:hiddenLine xmlns:a14="http://schemas.microsoft.com/office/drawing/2010/main" xmlns="" w="9525">
+                <a14:hiddenLine xmlns="" xmlns:a14="http://schemas.microsoft.com/office/drawing/2010/main" w="9525">
                   <a:solidFill>
                     <a:srgbClr val="000000"/>
                   </a:solidFill>
@@ -1297,7 +1298,7 @@
             </a:ln>
             <a:extLst>
               <a:ext uri="{91240B29-F687-4f45-9708-019B960494DF}">
-                <a14:hiddenLine xmlns:a14="http://schemas.microsoft.com/office/drawing/2010/main" xmlns="" w="9525">
+                <a14:hiddenLine xmlns="" xmlns:a14="http://schemas.microsoft.com/office/drawing/2010/main" w="9525">
                   <a:solidFill>
                     <a:srgbClr val="000000"/>
                   </a:solidFill>
@@ -1387,7 +1388,7 @@
             </a:ln>
             <a:extLst>
               <a:ext uri="{91240B29-F687-4f45-9708-019B960494DF}">
-                <a14:hiddenLine xmlns:a14="http://schemas.microsoft.com/office/drawing/2010/main" xmlns="" w="9525">
+                <a14:hiddenLine xmlns="" xmlns:a14="http://schemas.microsoft.com/office/drawing/2010/main" w="9525">
                   <a:solidFill>
                     <a:srgbClr val="000000"/>
                   </a:solidFill>
@@ -1477,7 +1478,7 @@
             </a:ln>
             <a:extLst>
               <a:ext uri="{91240B29-F687-4f45-9708-019B960494DF}">
-                <a14:hiddenLine xmlns:a14="http://schemas.microsoft.com/office/drawing/2010/main" xmlns="" w="9525">
+                <a14:hiddenLine xmlns="" xmlns:a14="http://schemas.microsoft.com/office/drawing/2010/main" w="9525">
                   <a:solidFill>
                     <a:srgbClr val="000000"/>
                   </a:solidFill>
@@ -1539,7 +1540,7 @@
             </a:ln>
             <a:extLst>
               <a:ext uri="{91240B29-F687-4f45-9708-019B960494DF}">
-                <a14:hiddenLine xmlns:a14="http://schemas.microsoft.com/office/drawing/2010/main" xmlns="" w="9525">
+                <a14:hiddenLine xmlns="" xmlns:a14="http://schemas.microsoft.com/office/drawing/2010/main" w="9525">
                   <a:solidFill>
                     <a:srgbClr val="000000"/>
                   </a:solidFill>
@@ -1629,7 +1630,7 @@
             </a:ln>
             <a:extLst>
               <a:ext uri="{91240B29-F687-4f45-9708-019B960494DF}">
-                <a14:hiddenLine xmlns:a14="http://schemas.microsoft.com/office/drawing/2010/main" xmlns="" w="9525">
+                <a14:hiddenLine xmlns="" xmlns:a14="http://schemas.microsoft.com/office/drawing/2010/main" w="9525">
                   <a:solidFill>
                     <a:srgbClr val="000000"/>
                   </a:solidFill>
@@ -1719,7 +1720,7 @@
             </a:ln>
             <a:extLst>
               <a:ext uri="{91240B29-F687-4f45-9708-019B960494DF}">
-                <a14:hiddenLine xmlns:a14="http://schemas.microsoft.com/office/drawing/2010/main" xmlns="" w="9525">
+                <a14:hiddenLine xmlns="" xmlns:a14="http://schemas.microsoft.com/office/drawing/2010/main" w="9525">
                   <a:solidFill>
                     <a:srgbClr val="000000"/>
                   </a:solidFill>
@@ -1775,7 +1776,7 @@
             </a:ln>
             <a:extLst>
               <a:ext uri="{91240B29-F687-4f45-9708-019B960494DF}">
-                <a14:hiddenLine xmlns:a14="http://schemas.microsoft.com/office/drawing/2010/main" xmlns="" w="9525">
+                <a14:hiddenLine xmlns="" xmlns:a14="http://schemas.microsoft.com/office/drawing/2010/main" w="9525">
                   <a:solidFill>
                     <a:srgbClr val="000000"/>
                   </a:solidFill>
@@ -1865,7 +1866,7 @@
             </a:ln>
             <a:extLst>
               <a:ext uri="{91240B29-F687-4f45-9708-019B960494DF}">
-                <a14:hiddenLine xmlns:a14="http://schemas.microsoft.com/office/drawing/2010/main" xmlns="" w="9525">
+                <a14:hiddenLine xmlns="" xmlns:a14="http://schemas.microsoft.com/office/drawing/2010/main" w="9525">
                   <a:solidFill>
                     <a:srgbClr val="000000"/>
                   </a:solidFill>
@@ -1921,7 +1922,7 @@
             </a:ln>
             <a:extLst>
               <a:ext uri="{91240B29-F687-4f45-9708-019B960494DF}">
-                <a14:hiddenLine xmlns:a14="http://schemas.microsoft.com/office/drawing/2010/main" xmlns="" w="9525">
+                <a14:hiddenLine xmlns="" xmlns:a14="http://schemas.microsoft.com/office/drawing/2010/main" w="9525">
                   <a:solidFill>
                     <a:srgbClr val="000000"/>
                   </a:solidFill>
@@ -2011,7 +2012,7 @@
             </a:ln>
             <a:extLst>
               <a:ext uri="{91240B29-F687-4f45-9708-019B960494DF}">
-                <a14:hiddenLine xmlns:a14="http://schemas.microsoft.com/office/drawing/2010/main" xmlns="" w="9525">
+                <a14:hiddenLine xmlns="" xmlns:a14="http://schemas.microsoft.com/office/drawing/2010/main" w="9525">
                   <a:solidFill>
                     <a:srgbClr val="000000"/>
                   </a:solidFill>
@@ -2079,7 +2080,7 @@
             </a:ln>
             <a:extLst>
               <a:ext uri="{91240B29-F687-4f45-9708-019B960494DF}">
-                <a14:hiddenLine xmlns:a14="http://schemas.microsoft.com/office/drawing/2010/main" xmlns="" w="9525">
+                <a14:hiddenLine xmlns="" xmlns:a14="http://schemas.microsoft.com/office/drawing/2010/main" w="9525">
                   <a:solidFill>
                     <a:srgbClr val="000000"/>
                   </a:solidFill>
@@ -2169,7 +2170,7 @@
             </a:ln>
             <a:extLst>
               <a:ext uri="{91240B29-F687-4f45-9708-019B960494DF}">
-                <a14:hiddenLine xmlns:a14="http://schemas.microsoft.com/office/drawing/2010/main" xmlns="" w="9525">
+                <a14:hiddenLine xmlns="" xmlns:a14="http://schemas.microsoft.com/office/drawing/2010/main" w="9525">
                   <a:solidFill>
                     <a:srgbClr val="000000"/>
                   </a:solidFill>
@@ -2237,7 +2238,7 @@
             </a:ln>
             <a:extLst>
               <a:ext uri="{91240B29-F687-4f45-9708-019B960494DF}">
-                <a14:hiddenLine xmlns:a14="http://schemas.microsoft.com/office/drawing/2010/main" xmlns="" w="9525">
+                <a14:hiddenLine xmlns="" xmlns:a14="http://schemas.microsoft.com/office/drawing/2010/main" w="9525">
                   <a:solidFill>
                     <a:srgbClr val="000000"/>
                   </a:solidFill>
@@ -2327,7 +2328,7 @@
             </a:ln>
             <a:extLst>
               <a:ext uri="{91240B29-F687-4f45-9708-019B960494DF}">
-                <a14:hiddenLine xmlns:a14="http://schemas.microsoft.com/office/drawing/2010/main" xmlns="" w="9525">
+                <a14:hiddenLine xmlns="" xmlns:a14="http://schemas.microsoft.com/office/drawing/2010/main" w="9525">
                   <a:solidFill>
                     <a:srgbClr val="000000"/>
                   </a:solidFill>
@@ -2361,7 +2362,7 @@
             </a:ln>
             <a:extLst>
               <a:ext uri="{91240B29-F687-4f45-9708-019B960494DF}">
-                <a14:hiddenLine xmlns:a14="http://schemas.microsoft.com/office/drawing/2010/main" xmlns="" w="9525">
+                <a14:hiddenLine xmlns="" xmlns:a14="http://schemas.microsoft.com/office/drawing/2010/main" w="9525">
                   <a:solidFill>
                     <a:srgbClr val="000000"/>
                   </a:solidFill>
@@ -2451,7 +2452,7 @@
             </a:ln>
             <a:extLst>
               <a:ext uri="{91240B29-F687-4f45-9708-019B960494DF}">
-                <a14:hiddenLine xmlns:a14="http://schemas.microsoft.com/office/drawing/2010/main" xmlns="" w="9525">
+                <a14:hiddenLine xmlns="" xmlns:a14="http://schemas.microsoft.com/office/drawing/2010/main" w="9525">
                   <a:solidFill>
                     <a:srgbClr val="000000"/>
                   </a:solidFill>
@@ -2513,7 +2514,7 @@
             </a:ln>
             <a:extLst>
               <a:ext uri="{91240B29-F687-4f45-9708-019B960494DF}">
-                <a14:hiddenLine xmlns:a14="http://schemas.microsoft.com/office/drawing/2010/main" xmlns="" w="9525">
+                <a14:hiddenLine xmlns="" xmlns:a14="http://schemas.microsoft.com/office/drawing/2010/main" w="9525">
                   <a:solidFill>
                     <a:srgbClr val="000000"/>
                   </a:solidFill>
@@ -2575,7 +2576,7 @@
             </a:ln>
             <a:extLst>
               <a:ext uri="{91240B29-F687-4f45-9708-019B960494DF}">
-                <a14:hiddenLine xmlns:a14="http://schemas.microsoft.com/office/drawing/2010/main" xmlns="" w="9525">
+                <a14:hiddenLine xmlns="" xmlns:a14="http://schemas.microsoft.com/office/drawing/2010/main" w="9525">
                   <a:solidFill>
                     <a:srgbClr val="000000"/>
                   </a:solidFill>
@@ -2665,7 +2666,7 @@
             </a:ln>
             <a:extLst>
               <a:ext uri="{91240B29-F687-4f45-9708-019B960494DF}">
-                <a14:hiddenLine xmlns:a14="http://schemas.microsoft.com/office/drawing/2010/main" xmlns="" w="9525">
+                <a14:hiddenLine xmlns="" xmlns:a14="http://schemas.microsoft.com/office/drawing/2010/main" w="9525">
                   <a:solidFill>
                     <a:srgbClr val="000000"/>
                   </a:solidFill>
@@ -2733,7 +2734,7 @@
             </a:ln>
             <a:extLst>
               <a:ext uri="{91240B29-F687-4f45-9708-019B960494DF}">
-                <a14:hiddenLine xmlns:a14="http://schemas.microsoft.com/office/drawing/2010/main" xmlns="" w="9525">
+                <a14:hiddenLine xmlns="" xmlns:a14="http://schemas.microsoft.com/office/drawing/2010/main" w="9525">
                   <a:solidFill>
                     <a:srgbClr val="000000"/>
                   </a:solidFill>
@@ -2795,7 +2796,7 @@
             </a:ln>
             <a:extLst>
               <a:ext uri="{91240B29-F687-4f45-9708-019B960494DF}">
-                <a14:hiddenLine xmlns:a14="http://schemas.microsoft.com/office/drawing/2010/main" xmlns="" w="9525">
+                <a14:hiddenLine xmlns="" xmlns:a14="http://schemas.microsoft.com/office/drawing/2010/main" w="9525">
                   <a:solidFill>
                     <a:srgbClr val="000000"/>
                   </a:solidFill>
@@ -2885,7 +2886,7 @@
             </a:ln>
             <a:extLst>
               <a:ext uri="{91240B29-F687-4f45-9708-019B960494DF}">
-                <a14:hiddenLine xmlns:a14="http://schemas.microsoft.com/office/drawing/2010/main" xmlns="" w="9525">
+                <a14:hiddenLine xmlns="" xmlns:a14="http://schemas.microsoft.com/office/drawing/2010/main" w="9525">
                   <a:solidFill>
                     <a:srgbClr val="000000"/>
                   </a:solidFill>
@@ -2947,7 +2948,7 @@
             </a:ln>
             <a:extLst>
               <a:ext uri="{91240B29-F687-4f45-9708-019B960494DF}">
-                <a14:hiddenLine xmlns:a14="http://schemas.microsoft.com/office/drawing/2010/main" xmlns="" w="9525">
+                <a14:hiddenLine xmlns="" xmlns:a14="http://schemas.microsoft.com/office/drawing/2010/main" w="9525">
                   <a:solidFill>
                     <a:srgbClr val="000000"/>
                   </a:solidFill>
@@ -3037,7 +3038,7 @@
             </a:ln>
             <a:extLst>
               <a:ext uri="{91240B29-F687-4f45-9708-019B960494DF}">
-                <a14:hiddenLine xmlns:a14="http://schemas.microsoft.com/office/drawing/2010/main" xmlns="" w="9525">
+                <a14:hiddenLine xmlns="" xmlns:a14="http://schemas.microsoft.com/office/drawing/2010/main" w="9525">
                   <a:solidFill>
                     <a:srgbClr val="000000"/>
                   </a:solidFill>
@@ -3099,7 +3100,7 @@
             </a:ln>
             <a:extLst>
               <a:ext uri="{91240B29-F687-4f45-9708-019B960494DF}">
-                <a14:hiddenLine xmlns:a14="http://schemas.microsoft.com/office/drawing/2010/main" xmlns="" w="9525">
+                <a14:hiddenLine xmlns="" xmlns:a14="http://schemas.microsoft.com/office/drawing/2010/main" w="9525">
                   <a:solidFill>
                     <a:srgbClr val="000000"/>
                   </a:solidFill>
@@ -3189,7 +3190,7 @@
             </a:ln>
             <a:extLst>
               <a:ext uri="{91240B29-F687-4f45-9708-019B960494DF}">
-                <a14:hiddenLine xmlns:a14="http://schemas.microsoft.com/office/drawing/2010/main" xmlns="" w="9525">
+                <a14:hiddenLine xmlns="" xmlns:a14="http://schemas.microsoft.com/office/drawing/2010/main" w="9525">
                   <a:solidFill>
                     <a:srgbClr val="000000"/>
                   </a:solidFill>
@@ -3223,7 +3224,7 @@
             </a:ln>
             <a:extLst>
               <a:ext uri="{91240B29-F687-4f45-9708-019B960494DF}">
-                <a14:hiddenLine xmlns:a14="http://schemas.microsoft.com/office/drawing/2010/main" xmlns="" w="9525">
+                <a14:hiddenLine xmlns="" xmlns:a14="http://schemas.microsoft.com/office/drawing/2010/main" w="9525">
                   <a:solidFill>
                     <a:srgbClr val="000000"/>
                   </a:solidFill>
@@ -3288,7 +3289,7 @@
             </a:ln>
             <a:extLst>
               <a:ext uri="{91240B29-F687-4f45-9708-019B960494DF}">
-                <a14:hiddenLine xmlns:a14="http://schemas.microsoft.com/office/drawing/2010/main" xmlns="" w="9525">
+                <a14:hiddenLine xmlns="" xmlns:a14="http://schemas.microsoft.com/office/drawing/2010/main" w="9525">
                   <a:solidFill>
                     <a:srgbClr val="000000"/>
                   </a:solidFill>
@@ -3378,7 +3379,7 @@
             </a:ln>
             <a:extLst>
               <a:ext uri="{91240B29-F687-4f45-9708-019B960494DF}">
-                <a14:hiddenLine xmlns:a14="http://schemas.microsoft.com/office/drawing/2010/main" xmlns="" w="9525">
+                <a14:hiddenLine xmlns="" xmlns:a14="http://schemas.microsoft.com/office/drawing/2010/main" w="9525">
                   <a:solidFill>
                     <a:srgbClr val="000000"/>
                   </a:solidFill>
@@ -3440,7 +3441,7 @@
             </a:ln>
             <a:extLst>
               <a:ext uri="{91240B29-F687-4f45-9708-019B960494DF}">
-                <a14:hiddenLine xmlns:a14="http://schemas.microsoft.com/office/drawing/2010/main" xmlns="" w="9525">
+                <a14:hiddenLine xmlns="" xmlns:a14="http://schemas.microsoft.com/office/drawing/2010/main" w="9525">
                   <a:solidFill>
                     <a:srgbClr val="000000"/>
                   </a:solidFill>
@@ -3530,7 +3531,7 @@
             </a:ln>
             <a:extLst>
               <a:ext uri="{91240B29-F687-4f45-9708-019B960494DF}">
-                <a14:hiddenLine xmlns:a14="http://schemas.microsoft.com/office/drawing/2010/main" xmlns="" w="9525">
+                <a14:hiddenLine xmlns="" xmlns:a14="http://schemas.microsoft.com/office/drawing/2010/main" w="9525">
                   <a:solidFill>
                     <a:srgbClr val="000000"/>
                   </a:solidFill>
@@ -3620,7 +3621,7 @@
             </a:ln>
             <a:extLst>
               <a:ext uri="{91240B29-F687-4f45-9708-019B960494DF}">
-                <a14:hiddenLine xmlns:a14="http://schemas.microsoft.com/office/drawing/2010/main" xmlns="" w="9525">
+                <a14:hiddenLine xmlns="" xmlns:a14="http://schemas.microsoft.com/office/drawing/2010/main" w="9525">
                   <a:solidFill>
                     <a:srgbClr val="000000"/>
                   </a:solidFill>
@@ -3685,7 +3686,7 @@
             </a:ln>
             <a:extLst>
               <a:ext uri="{91240B29-F687-4f45-9708-019B960494DF}">
-                <a14:hiddenLine xmlns:a14="http://schemas.microsoft.com/office/drawing/2010/main" xmlns="" w="9525">
+                <a14:hiddenLine xmlns="" xmlns:a14="http://schemas.microsoft.com/office/drawing/2010/main" w="9525">
                   <a:solidFill>
                     <a:srgbClr val="000000"/>
                   </a:solidFill>
@@ -3747,7 +3748,7 @@
             </a:ln>
             <a:extLst>
               <a:ext uri="{91240B29-F687-4f45-9708-019B960494DF}">
-                <a14:hiddenLine xmlns:a14="http://schemas.microsoft.com/office/drawing/2010/main" xmlns="" w="9525">
+                <a14:hiddenLine xmlns="" xmlns:a14="http://schemas.microsoft.com/office/drawing/2010/main" w="9525">
                   <a:solidFill>
                     <a:srgbClr val="000000"/>
                   </a:solidFill>
@@ -3837,7 +3838,7 @@
             </a:ln>
             <a:extLst>
               <a:ext uri="{91240B29-F687-4f45-9708-019B960494DF}">
-                <a14:hiddenLine xmlns:a14="http://schemas.microsoft.com/office/drawing/2010/main" xmlns="" w="9525">
+                <a14:hiddenLine xmlns="" xmlns:a14="http://schemas.microsoft.com/office/drawing/2010/main" w="9525">
                   <a:solidFill>
                     <a:srgbClr val="000000"/>
                   </a:solidFill>
@@ -3927,7 +3928,7 @@
             </a:ln>
             <a:extLst>
               <a:ext uri="{91240B29-F687-4f45-9708-019B960494DF}">
-                <a14:hiddenLine xmlns:a14="http://schemas.microsoft.com/office/drawing/2010/main" xmlns="" w="9525">
+                <a14:hiddenLine xmlns="" xmlns:a14="http://schemas.microsoft.com/office/drawing/2010/main" w="9525">
                   <a:solidFill>
                     <a:srgbClr val="000000"/>
                   </a:solidFill>
@@ -3989,7 +3990,7 @@
             </a:ln>
             <a:extLst>
               <a:ext uri="{91240B29-F687-4f45-9708-019B960494DF}">
-                <a14:hiddenLine xmlns:a14="http://schemas.microsoft.com/office/drawing/2010/main" xmlns="" w="9525">
+                <a14:hiddenLine xmlns="" xmlns:a14="http://schemas.microsoft.com/office/drawing/2010/main" w="9525">
                   <a:solidFill>
                     <a:srgbClr val="000000"/>
                   </a:solidFill>
@@ -4109,7 +4110,7 @@
             </a:ln>
             <a:extLst>
               <a:ext uri="{91240B29-F687-4f45-9708-019B960494DF}">
-                <a14:hiddenLine xmlns:a14="http://schemas.microsoft.com/office/drawing/2010/main" xmlns="" w="9525">
+                <a14:hiddenLine xmlns="" xmlns:a14="http://schemas.microsoft.com/office/drawing/2010/main" w="9525">
                   <a:solidFill>
                     <a:srgbClr val="000000"/>
                   </a:solidFill>
@@ -4177,7 +4178,7 @@
             </a:ln>
             <a:extLst>
               <a:ext uri="{91240B29-F687-4f45-9708-019B960494DF}">
-                <a14:hiddenLine xmlns:a14="http://schemas.microsoft.com/office/drawing/2010/main" xmlns="" w="9525">
+                <a14:hiddenLine xmlns="" xmlns:a14="http://schemas.microsoft.com/office/drawing/2010/main" w="9525">
                   <a:solidFill>
                     <a:srgbClr val="000000"/>
                   </a:solidFill>
@@ -4267,7 +4268,7 @@
             </a:ln>
             <a:extLst>
               <a:ext uri="{91240B29-F687-4f45-9708-019B960494DF}">
-                <a14:hiddenLine xmlns:a14="http://schemas.microsoft.com/office/drawing/2010/main" xmlns="" w="9525">
+                <a14:hiddenLine xmlns="" xmlns:a14="http://schemas.microsoft.com/office/drawing/2010/main" w="9525">
                   <a:solidFill>
                     <a:srgbClr val="000000"/>
                   </a:solidFill>
@@ -4407,7 +4408,7 @@
           <a:p>
             <a:fld id="{5B1DC2E1-4C29-49D5-9C44-39D0F45E88F8}" type="datetimeFigureOut">
               <a:rPr lang="en-US" smtClean="0"/>
-              <a:t>7/3/2022</a:t>
+              <a:t>7/4/2022</a:t>
             </a:fld>
             <a:endParaRPr lang="en-US"/>
           </a:p>
@@ -4674,7 +4675,7 @@
           <a:p>
             <a:fld id="{5B1DC2E1-4C29-49D5-9C44-39D0F45E88F8}" type="datetimeFigureOut">
               <a:rPr lang="en-US" smtClean="0"/>
-              <a:t>7/3/2022</a:t>
+              <a:t>7/4/2022</a:t>
             </a:fld>
             <a:endParaRPr lang="en-US"/>
           </a:p>
@@ -4870,7 +4871,7 @@
           <a:p>
             <a:fld id="{5B1DC2E1-4C29-49D5-9C44-39D0F45E88F8}" type="datetimeFigureOut">
               <a:rPr lang="en-US" smtClean="0"/>
-              <a:t>7/3/2022</a:t>
+              <a:t>7/4/2022</a:t>
             </a:fld>
             <a:endParaRPr lang="en-US"/>
           </a:p>
@@ -5133,7 +5134,7 @@
           <a:p>
             <a:fld id="{5B1DC2E1-4C29-49D5-9C44-39D0F45E88F8}" type="datetimeFigureOut">
               <a:rPr lang="en-US" smtClean="0"/>
-              <a:t>7/3/2022</a:t>
+              <a:t>7/4/2022</a:t>
             </a:fld>
             <a:endParaRPr lang="en-US"/>
           </a:p>
@@ -5567,7 +5568,7 @@
           <a:p>
             <a:fld id="{5B1DC2E1-4C29-49D5-9C44-39D0F45E88F8}" type="datetimeFigureOut">
               <a:rPr lang="en-US" smtClean="0"/>
-              <a:t>7/3/2022</a:t>
+              <a:t>7/4/2022</a:t>
             </a:fld>
             <a:endParaRPr lang="en-US"/>
           </a:p>
@@ -6113,7 +6114,7 @@
           <a:p>
             <a:fld id="{5B1DC2E1-4C29-49D5-9C44-39D0F45E88F8}" type="datetimeFigureOut">
               <a:rPr lang="en-US" smtClean="0"/>
-              <a:t>7/3/2022</a:t>
+              <a:t>7/4/2022</a:t>
             </a:fld>
             <a:endParaRPr lang="en-US"/>
           </a:p>
@@ -6833,7 +6834,7 @@
           <a:p>
             <a:fld id="{5B1DC2E1-4C29-49D5-9C44-39D0F45E88F8}" type="datetimeFigureOut">
               <a:rPr lang="en-US" smtClean="0"/>
-              <a:t>7/3/2022</a:t>
+              <a:t>7/4/2022</a:t>
             </a:fld>
             <a:endParaRPr lang="en-US"/>
           </a:p>
@@ -7003,7 +7004,7 @@
           <a:p>
             <a:fld id="{5B1DC2E1-4C29-49D5-9C44-39D0F45E88F8}" type="datetimeFigureOut">
               <a:rPr lang="en-US" smtClean="0"/>
-              <a:t>7/3/2022</a:t>
+              <a:t>7/4/2022</a:t>
             </a:fld>
             <a:endParaRPr lang="en-US"/>
           </a:p>
@@ -7183,7 +7184,7 @@
           <a:p>
             <a:fld id="{5B1DC2E1-4C29-49D5-9C44-39D0F45E88F8}" type="datetimeFigureOut">
               <a:rPr lang="en-US" smtClean="0"/>
-              <a:t>7/3/2022</a:t>
+              <a:t>7/4/2022</a:t>
             </a:fld>
             <a:endParaRPr lang="en-US"/>
           </a:p>
@@ -7353,7 +7354,7 @@
           <a:p>
             <a:fld id="{5B1DC2E1-4C29-49D5-9C44-39D0F45E88F8}" type="datetimeFigureOut">
               <a:rPr lang="en-US" smtClean="0"/>
-              <a:t>7/3/2022</a:t>
+              <a:t>7/4/2022</a:t>
             </a:fld>
             <a:endParaRPr lang="en-US"/>
           </a:p>
@@ -7603,7 +7604,7 @@
           <a:p>
             <a:fld id="{5B1DC2E1-4C29-49D5-9C44-39D0F45E88F8}" type="datetimeFigureOut">
               <a:rPr lang="en-US" smtClean="0"/>
-              <a:t>7/3/2022</a:t>
+              <a:t>7/4/2022</a:t>
             </a:fld>
             <a:endParaRPr lang="en-US"/>
           </a:p>
@@ -7835,7 +7836,7 @@
           <a:p>
             <a:fld id="{5B1DC2E1-4C29-49D5-9C44-39D0F45E88F8}" type="datetimeFigureOut">
               <a:rPr lang="en-US" smtClean="0"/>
-              <a:t>7/3/2022</a:t>
+              <a:t>7/4/2022</a:t>
             </a:fld>
             <a:endParaRPr lang="en-US"/>
           </a:p>
@@ -8216,7 +8217,7 @@
           <a:p>
             <a:fld id="{5B1DC2E1-4C29-49D5-9C44-39D0F45E88F8}" type="datetimeFigureOut">
               <a:rPr lang="en-US" smtClean="0"/>
-              <a:t>7/3/2022</a:t>
+              <a:t>7/4/2022</a:t>
             </a:fld>
             <a:endParaRPr lang="en-US"/>
           </a:p>
@@ -8334,7 +8335,7 @@
           <a:p>
             <a:fld id="{5B1DC2E1-4C29-49D5-9C44-39D0F45E88F8}" type="datetimeFigureOut">
               <a:rPr lang="en-US" smtClean="0"/>
-              <a:t>7/3/2022</a:t>
+              <a:t>7/4/2022</a:t>
             </a:fld>
             <a:endParaRPr lang="en-US"/>
           </a:p>
@@ -8429,7 +8430,7 @@
           <a:p>
             <a:fld id="{5B1DC2E1-4C29-49D5-9C44-39D0F45E88F8}" type="datetimeFigureOut">
               <a:rPr lang="en-US" smtClean="0"/>
-              <a:t>7/3/2022</a:t>
+              <a:t>7/4/2022</a:t>
             </a:fld>
             <a:endParaRPr lang="en-US"/>
           </a:p>
@@ -8678,7 +8679,7 @@
           <a:p>
             <a:fld id="{5B1DC2E1-4C29-49D5-9C44-39D0F45E88F8}" type="datetimeFigureOut">
               <a:rPr lang="en-US" smtClean="0"/>
-              <a:t>7/3/2022</a:t>
+              <a:t>7/4/2022</a:t>
             </a:fld>
             <a:endParaRPr lang="en-US"/>
           </a:p>
@@ -8958,7 +8959,7 @@
           <a:p>
             <a:fld id="{5B1DC2E1-4C29-49D5-9C44-39D0F45E88F8}" type="datetimeFigureOut">
               <a:rPr lang="en-US" smtClean="0"/>
-              <a:t>7/3/2022</a:t>
+              <a:t>7/4/2022</a:t>
             </a:fld>
             <a:endParaRPr lang="en-US"/>
           </a:p>
@@ -9074,7 +9075,7 @@
           <a:noFill/>
           <a:extLst>
             <a:ext uri="{909E8E84-426E-40dd-AFC4-6F175D3DCCD1}">
-              <a14:hiddenFill xmlns:a14="http://schemas.microsoft.com/office/drawing/2010/main" xmlns="">
+              <a14:hiddenFill xmlns="" xmlns:a14="http://schemas.microsoft.com/office/drawing/2010/main">
                 <a:solidFill>
                   <a:srgbClr val="FFFFFF"/>
                 </a:solidFill>
@@ -9148,7 +9149,7 @@
               </a:ln>
               <a:extLst>
                 <a:ext uri="{91240B29-F687-4f45-9708-019B960494DF}">
-                  <a14:hiddenLine xmlns:a14="http://schemas.microsoft.com/office/drawing/2010/main" xmlns="" w="9525">
+                  <a14:hiddenLine xmlns="" xmlns:a14="http://schemas.microsoft.com/office/drawing/2010/main" w="9525">
                     <a:solidFill>
                       <a:srgbClr val="000000"/>
                     </a:solidFill>
@@ -9238,7 +9239,7 @@
               </a:ln>
               <a:extLst>
                 <a:ext uri="{91240B29-F687-4f45-9708-019B960494DF}">
-                  <a14:hiddenLine xmlns:a14="http://schemas.microsoft.com/office/drawing/2010/main" xmlns="" w="9525">
+                  <a14:hiddenLine xmlns="" xmlns:a14="http://schemas.microsoft.com/office/drawing/2010/main" w="9525">
                     <a:solidFill>
                       <a:srgbClr val="000000"/>
                     </a:solidFill>
@@ -9328,7 +9329,7 @@
               </a:ln>
               <a:extLst>
                 <a:ext uri="{91240B29-F687-4f45-9708-019B960494DF}">
-                  <a14:hiddenLine xmlns:a14="http://schemas.microsoft.com/office/drawing/2010/main" xmlns="" w="9525">
+                  <a14:hiddenLine xmlns="" xmlns:a14="http://schemas.microsoft.com/office/drawing/2010/main" w="9525">
                     <a:solidFill>
                       <a:srgbClr val="000000"/>
                     </a:solidFill>
@@ -9390,7 +9391,7 @@
               </a:ln>
               <a:extLst>
                 <a:ext uri="{91240B29-F687-4f45-9708-019B960494DF}">
-                  <a14:hiddenLine xmlns:a14="http://schemas.microsoft.com/office/drawing/2010/main" xmlns="" w="9525">
+                  <a14:hiddenLine xmlns="" xmlns:a14="http://schemas.microsoft.com/office/drawing/2010/main" w="9525">
                     <a:solidFill>
                       <a:srgbClr val="000000"/>
                     </a:solidFill>
@@ -9480,7 +9481,7 @@
               </a:ln>
               <a:extLst>
                 <a:ext uri="{91240B29-F687-4f45-9708-019B960494DF}">
-                  <a14:hiddenLine xmlns:a14="http://schemas.microsoft.com/office/drawing/2010/main" xmlns="" w="9525">
+                  <a14:hiddenLine xmlns="" xmlns:a14="http://schemas.microsoft.com/office/drawing/2010/main" w="9525">
                     <a:solidFill>
                       <a:srgbClr val="000000"/>
                     </a:solidFill>
@@ -9542,7 +9543,7 @@
               </a:ln>
               <a:extLst>
                 <a:ext uri="{91240B29-F687-4f45-9708-019B960494DF}">
-                  <a14:hiddenLine xmlns:a14="http://schemas.microsoft.com/office/drawing/2010/main" xmlns="" w="9525">
+                  <a14:hiddenLine xmlns="" xmlns:a14="http://schemas.microsoft.com/office/drawing/2010/main" w="9525">
                     <a:solidFill>
                       <a:srgbClr val="000000"/>
                     </a:solidFill>
@@ -9604,7 +9605,7 @@
               </a:ln>
               <a:extLst>
                 <a:ext uri="{91240B29-F687-4f45-9708-019B960494DF}">
-                  <a14:hiddenLine xmlns:a14="http://schemas.microsoft.com/office/drawing/2010/main" xmlns="" w="9525">
+                  <a14:hiddenLine xmlns="" xmlns:a14="http://schemas.microsoft.com/office/drawing/2010/main" w="9525">
                     <a:solidFill>
                       <a:srgbClr val="000000"/>
                     </a:solidFill>
@@ -9694,7 +9695,7 @@
               </a:ln>
               <a:extLst>
                 <a:ext uri="{91240B29-F687-4f45-9708-019B960494DF}">
-                  <a14:hiddenLine xmlns:a14="http://schemas.microsoft.com/office/drawing/2010/main" xmlns="" w="9525">
+                  <a14:hiddenLine xmlns="" xmlns:a14="http://schemas.microsoft.com/office/drawing/2010/main" w="9525">
                     <a:solidFill>
                       <a:srgbClr val="000000"/>
                     </a:solidFill>
@@ -9784,7 +9785,7 @@
               </a:ln>
               <a:extLst>
                 <a:ext uri="{91240B29-F687-4f45-9708-019B960494DF}">
-                  <a14:hiddenLine xmlns:a14="http://schemas.microsoft.com/office/drawing/2010/main" xmlns="" w="9525">
+                  <a14:hiddenLine xmlns="" xmlns:a14="http://schemas.microsoft.com/office/drawing/2010/main" w="9525">
                     <a:solidFill>
                       <a:srgbClr val="000000"/>
                     </a:solidFill>
@@ -9846,7 +9847,7 @@
               </a:ln>
               <a:extLst>
                 <a:ext uri="{91240B29-F687-4f45-9708-019B960494DF}">
-                  <a14:hiddenLine xmlns:a14="http://schemas.microsoft.com/office/drawing/2010/main" xmlns="" w="9525">
+                  <a14:hiddenLine xmlns="" xmlns:a14="http://schemas.microsoft.com/office/drawing/2010/main" w="9525">
                     <a:solidFill>
                       <a:srgbClr val="000000"/>
                     </a:solidFill>
@@ -9956,7 +9957,7 @@
               </a:ln>
               <a:extLst>
                 <a:ext uri="{91240B29-F687-4f45-9708-019B960494DF}">
-                  <a14:hiddenLine xmlns:a14="http://schemas.microsoft.com/office/drawing/2010/main" xmlns="" w="9525">
+                  <a14:hiddenLine xmlns="" xmlns:a14="http://schemas.microsoft.com/office/drawing/2010/main" w="9525">
                     <a:solidFill>
                       <a:srgbClr val="000000"/>
                     </a:solidFill>
@@ -10040,7 +10041,7 @@
               </a:ln>
               <a:extLst>
                 <a:ext uri="{91240B29-F687-4f45-9708-019B960494DF}">
-                  <a14:hiddenLine xmlns:a14="http://schemas.microsoft.com/office/drawing/2010/main" xmlns="" w="9525">
+                  <a14:hiddenLine xmlns="" xmlns:a14="http://schemas.microsoft.com/office/drawing/2010/main" w="9525">
                     <a:solidFill>
                       <a:srgbClr val="000000"/>
                     </a:solidFill>
@@ -10102,7 +10103,7 @@
               </a:ln>
               <a:extLst>
                 <a:ext uri="{91240B29-F687-4f45-9708-019B960494DF}">
-                  <a14:hiddenLine xmlns:a14="http://schemas.microsoft.com/office/drawing/2010/main" xmlns="" w="9525">
+                  <a14:hiddenLine xmlns="" xmlns:a14="http://schemas.microsoft.com/office/drawing/2010/main" w="9525">
                     <a:solidFill>
                       <a:srgbClr val="000000"/>
                     </a:solidFill>
@@ -10164,7 +10165,7 @@
               </a:ln>
               <a:extLst>
                 <a:ext uri="{91240B29-F687-4f45-9708-019B960494DF}">
-                  <a14:hiddenLine xmlns:a14="http://schemas.microsoft.com/office/drawing/2010/main" xmlns="" w="9525">
+                  <a14:hiddenLine xmlns="" xmlns:a14="http://schemas.microsoft.com/office/drawing/2010/main" w="9525">
                     <a:solidFill>
                       <a:srgbClr val="000000"/>
                     </a:solidFill>
@@ -10254,7 +10255,7 @@
               </a:ln>
               <a:extLst>
                 <a:ext uri="{91240B29-F687-4f45-9708-019B960494DF}">
-                  <a14:hiddenLine xmlns:a14="http://schemas.microsoft.com/office/drawing/2010/main" xmlns="" w="9525">
+                  <a14:hiddenLine xmlns="" xmlns:a14="http://schemas.microsoft.com/office/drawing/2010/main" w="9525">
                     <a:solidFill>
                       <a:srgbClr val="000000"/>
                     </a:solidFill>
@@ -10288,7 +10289,7 @@
               </a:ln>
               <a:extLst>
                 <a:ext uri="{91240B29-F687-4f45-9708-019B960494DF}">
-                  <a14:hiddenLine xmlns:a14="http://schemas.microsoft.com/office/drawing/2010/main" xmlns="" w="9525">
+                  <a14:hiddenLine xmlns="" xmlns:a14="http://schemas.microsoft.com/office/drawing/2010/main" w="9525">
                     <a:solidFill>
                       <a:srgbClr val="000000"/>
                     </a:solidFill>
@@ -10353,7 +10354,7 @@
               </a:ln>
               <a:extLst>
                 <a:ext uri="{91240B29-F687-4f45-9708-019B960494DF}">
-                  <a14:hiddenLine xmlns:a14="http://schemas.microsoft.com/office/drawing/2010/main" xmlns="" w="9525">
+                  <a14:hiddenLine xmlns="" xmlns:a14="http://schemas.microsoft.com/office/drawing/2010/main" w="9525">
                     <a:solidFill>
                       <a:srgbClr val="000000"/>
                     </a:solidFill>
@@ -10443,7 +10444,7 @@
               </a:ln>
               <a:extLst>
                 <a:ext uri="{91240B29-F687-4f45-9708-019B960494DF}">
-                  <a14:hiddenLine xmlns:a14="http://schemas.microsoft.com/office/drawing/2010/main" xmlns="" w="9525">
+                  <a14:hiddenLine xmlns="" xmlns:a14="http://schemas.microsoft.com/office/drawing/2010/main" w="9525">
                     <a:solidFill>
                       <a:srgbClr val="000000"/>
                     </a:solidFill>
@@ -10505,7 +10506,7 @@
               </a:ln>
               <a:extLst>
                 <a:ext uri="{91240B29-F687-4f45-9708-019B960494DF}">
-                  <a14:hiddenLine xmlns:a14="http://schemas.microsoft.com/office/drawing/2010/main" xmlns="" w="9525">
+                  <a14:hiddenLine xmlns="" xmlns:a14="http://schemas.microsoft.com/office/drawing/2010/main" w="9525">
                     <a:solidFill>
                       <a:srgbClr val="000000"/>
                     </a:solidFill>
@@ -10595,7 +10596,7 @@
               </a:ln>
               <a:extLst>
                 <a:ext uri="{91240B29-F687-4f45-9708-019B960494DF}">
-                  <a14:hiddenLine xmlns:a14="http://schemas.microsoft.com/office/drawing/2010/main" xmlns="" w="9525">
+                  <a14:hiddenLine xmlns="" xmlns:a14="http://schemas.microsoft.com/office/drawing/2010/main" w="9525">
                     <a:solidFill>
                       <a:srgbClr val="000000"/>
                     </a:solidFill>
@@ -10660,7 +10661,7 @@
               </a:ln>
               <a:extLst>
                 <a:ext uri="{91240B29-F687-4f45-9708-019B960494DF}">
-                  <a14:hiddenLine xmlns:a14="http://schemas.microsoft.com/office/drawing/2010/main" xmlns="" w="9525">
+                  <a14:hiddenLine xmlns="" xmlns:a14="http://schemas.microsoft.com/office/drawing/2010/main" w="9525">
                     <a:solidFill>
                       <a:srgbClr val="000000"/>
                     </a:solidFill>
@@ -10722,7 +10723,7 @@
               </a:ln>
               <a:extLst>
                 <a:ext uri="{91240B29-F687-4f45-9708-019B960494DF}">
-                  <a14:hiddenLine xmlns:a14="http://schemas.microsoft.com/office/drawing/2010/main" xmlns="" w="9525">
+                  <a14:hiddenLine xmlns="" xmlns:a14="http://schemas.microsoft.com/office/drawing/2010/main" w="9525">
                     <a:solidFill>
                       <a:srgbClr val="000000"/>
                     </a:solidFill>
@@ -10812,7 +10813,7 @@
               </a:ln>
               <a:extLst>
                 <a:ext uri="{91240B29-F687-4f45-9708-019B960494DF}">
-                  <a14:hiddenLine xmlns:a14="http://schemas.microsoft.com/office/drawing/2010/main" xmlns="" w="9525">
+                  <a14:hiddenLine xmlns="" xmlns:a14="http://schemas.microsoft.com/office/drawing/2010/main" w="9525">
                     <a:solidFill>
                       <a:srgbClr val="000000"/>
                     </a:solidFill>
@@ -10902,7 +10903,7 @@
               </a:ln>
               <a:extLst>
                 <a:ext uri="{91240B29-F687-4f45-9708-019B960494DF}">
-                  <a14:hiddenLine xmlns:a14="http://schemas.microsoft.com/office/drawing/2010/main" xmlns="" w="9525">
+                  <a14:hiddenLine xmlns="" xmlns:a14="http://schemas.microsoft.com/office/drawing/2010/main" w="9525">
                     <a:solidFill>
                       <a:srgbClr val="000000"/>
                     </a:solidFill>
@@ -10967,7 +10968,7 @@
               </a:ln>
               <a:extLst>
                 <a:ext uri="{91240B29-F687-4f45-9708-019B960494DF}">
-                  <a14:hiddenLine xmlns:a14="http://schemas.microsoft.com/office/drawing/2010/main" xmlns="" w="9525">
+                  <a14:hiddenLine xmlns="" xmlns:a14="http://schemas.microsoft.com/office/drawing/2010/main" w="9525">
                     <a:solidFill>
                       <a:srgbClr val="000000"/>
                     </a:solidFill>
@@ -11087,7 +11088,7 @@
               </a:ln>
               <a:extLst>
                 <a:ext uri="{91240B29-F687-4f45-9708-019B960494DF}">
-                  <a14:hiddenLine xmlns:a14="http://schemas.microsoft.com/office/drawing/2010/main" xmlns="" w="9525">
+                  <a14:hiddenLine xmlns="" xmlns:a14="http://schemas.microsoft.com/office/drawing/2010/main" w="9525">
                     <a:solidFill>
                       <a:srgbClr val="000000"/>
                     </a:solidFill>
@@ -11185,7 +11186,7 @@
               </a:ln>
               <a:extLst>
                 <a:ext uri="{91240B29-F687-4f45-9708-019B960494DF}">
-                  <a14:hiddenLine xmlns:a14="http://schemas.microsoft.com/office/drawing/2010/main" xmlns="" w="9525">
+                  <a14:hiddenLine xmlns="" xmlns:a14="http://schemas.microsoft.com/office/drawing/2010/main" w="9525">
                     <a:solidFill>
                       <a:srgbClr val="000000"/>
                     </a:solidFill>
@@ -11300,7 +11301,7 @@
               </a:ln>
               <a:extLst>
                 <a:ext uri="{91240B29-F687-4f45-9708-019B960494DF}">
-                  <a14:hiddenLine xmlns:a14="http://schemas.microsoft.com/office/drawing/2010/main" xmlns="" w="9525">
+                  <a14:hiddenLine xmlns="" xmlns:a14="http://schemas.microsoft.com/office/drawing/2010/main" w="9525">
                     <a:solidFill>
                       <a:srgbClr val="000000"/>
                     </a:solidFill>
@@ -11390,7 +11391,7 @@
               </a:ln>
               <a:extLst>
                 <a:ext uri="{91240B29-F687-4f45-9708-019B960494DF}">
-                  <a14:hiddenLine xmlns:a14="http://schemas.microsoft.com/office/drawing/2010/main" xmlns="" w="9525">
+                  <a14:hiddenLine xmlns="" xmlns:a14="http://schemas.microsoft.com/office/drawing/2010/main" w="9525">
                     <a:solidFill>
                       <a:srgbClr val="000000"/>
                     </a:solidFill>
@@ -11455,7 +11456,7 @@
               </a:ln>
               <a:extLst>
                 <a:ext uri="{91240B29-F687-4f45-9708-019B960494DF}">
-                  <a14:hiddenLine xmlns:a14="http://schemas.microsoft.com/office/drawing/2010/main" xmlns="" w="9525">
+                  <a14:hiddenLine xmlns="" xmlns:a14="http://schemas.microsoft.com/office/drawing/2010/main" w="9525">
                     <a:solidFill>
                       <a:srgbClr val="000000"/>
                     </a:solidFill>
@@ -11545,7 +11546,7 @@
               </a:ln>
               <a:extLst>
                 <a:ext uri="{91240B29-F687-4f45-9708-019B960494DF}">
-                  <a14:hiddenLine xmlns:a14="http://schemas.microsoft.com/office/drawing/2010/main" xmlns="" w="9525">
+                  <a14:hiddenLine xmlns="" xmlns:a14="http://schemas.microsoft.com/office/drawing/2010/main" w="9525">
                     <a:solidFill>
                       <a:srgbClr val="000000"/>
                     </a:solidFill>
@@ -11613,7 +11614,7 @@
               </a:ln>
               <a:extLst>
                 <a:ext uri="{91240B29-F687-4f45-9708-019B960494DF}">
-                  <a14:hiddenLine xmlns:a14="http://schemas.microsoft.com/office/drawing/2010/main" xmlns="" w="9525">
+                  <a14:hiddenLine xmlns="" xmlns:a14="http://schemas.microsoft.com/office/drawing/2010/main" w="9525">
                     <a:solidFill>
                       <a:srgbClr val="000000"/>
                     </a:solidFill>
@@ -11703,7 +11704,7 @@
               </a:ln>
               <a:extLst>
                 <a:ext uri="{91240B29-F687-4f45-9708-019B960494DF}">
-                  <a14:hiddenLine xmlns:a14="http://schemas.microsoft.com/office/drawing/2010/main" xmlns="" w="9525">
+                  <a14:hiddenLine xmlns="" xmlns:a14="http://schemas.microsoft.com/office/drawing/2010/main" w="9525">
                     <a:solidFill>
                       <a:srgbClr val="000000"/>
                     </a:solidFill>
@@ -11771,7 +11772,7 @@
               </a:ln>
               <a:extLst>
                 <a:ext uri="{91240B29-F687-4f45-9708-019B960494DF}">
-                  <a14:hiddenLine xmlns:a14="http://schemas.microsoft.com/office/drawing/2010/main" xmlns="" w="9525">
+                  <a14:hiddenLine xmlns="" xmlns:a14="http://schemas.microsoft.com/office/drawing/2010/main" w="9525">
                     <a:solidFill>
                       <a:srgbClr val="000000"/>
                     </a:solidFill>
@@ -11861,7 +11862,7 @@
               </a:ln>
               <a:extLst>
                 <a:ext uri="{91240B29-F687-4f45-9708-019B960494DF}">
-                  <a14:hiddenLine xmlns:a14="http://schemas.microsoft.com/office/drawing/2010/main" xmlns="" w="9525">
+                  <a14:hiddenLine xmlns="" xmlns:a14="http://schemas.microsoft.com/office/drawing/2010/main" w="9525">
                     <a:solidFill>
                       <a:srgbClr val="000000"/>
                     </a:solidFill>
@@ -11895,7 +11896,7 @@
               </a:ln>
               <a:extLst>
                 <a:ext uri="{91240B29-F687-4f45-9708-019B960494DF}">
-                  <a14:hiddenLine xmlns:a14="http://schemas.microsoft.com/office/drawing/2010/main" xmlns="" w="9525">
+                  <a14:hiddenLine xmlns="" xmlns:a14="http://schemas.microsoft.com/office/drawing/2010/main" w="9525">
                     <a:solidFill>
                       <a:srgbClr val="000000"/>
                     </a:solidFill>
@@ -12035,7 +12036,7 @@
           <a:p>
             <a:fld id="{5B1DC2E1-4C29-49D5-9C44-39D0F45E88F8}" type="datetimeFigureOut">
               <a:rPr lang="en-US" smtClean="0"/>
-              <a:t>7/3/2022</a:t>
+              <a:t>7/4/2022</a:t>
             </a:fld>
             <a:endParaRPr lang="en-US"/>
           </a:p>
@@ -12569,7 +12570,7 @@
         </p:nvSpPr>
         <p:spPr>
           <a:xfrm>
-            <a:off x="3124321" y="0"/>
+            <a:off x="4100174" y="-132366"/>
             <a:ext cx="8596668" cy="1320800"/>
           </a:xfrm>
         </p:spPr>
@@ -12580,10 +12581,10 @@
           <a:lstStyle/>
           <a:p>
             <a:r>
-              <a:rPr lang="en-US" sz="4400" b="1" dirty="0" smtClean="0"/>
-              <a:t>TOPICS list created</a:t>
-            </a:r>
-            <a:endParaRPr lang="en-US" b="1" dirty="0"/>
+              <a:rPr lang="en-US" sz="5400" b="1" dirty="0" smtClean="0"/>
+              <a:t>TOPICs</a:t>
+            </a:r>
+            <a:endParaRPr lang="en-US" sz="4400" b="1" dirty="0"/>
           </a:p>
         </p:txBody>
       </p:sp>
@@ -12603,8 +12604,229 @@
         </p:blipFill>
         <p:spPr>
           <a:xfrm>
-            <a:off x="1111070" y="1320799"/>
-            <a:ext cx="10223239" cy="4680755"/>
+            <a:off x="7094512" y="1056068"/>
+            <a:ext cx="4135543" cy="5633793"/>
+          </a:xfrm>
+          <a:prstGeom prst="rect">
+            <a:avLst/>
+          </a:prstGeom>
+        </p:spPr>
+      </p:pic>
+      <p:sp>
+        <p:nvSpPr>
+          <p:cNvPr id="6" name="Content Placeholder 2"/>
+          <p:cNvSpPr>
+            <a:spLocks noGrp="1"/>
+          </p:cNvSpPr>
+          <p:nvPr>
+            <p:ph idx="1"/>
+          </p:nvPr>
+        </p:nvSpPr>
+        <p:spPr>
+          <a:xfrm>
+            <a:off x="1105836" y="1188434"/>
+            <a:ext cx="5988676" cy="5633793"/>
+          </a:xfrm>
+        </p:spPr>
+        <p:txBody>
+          <a:bodyPr>
+            <a:normAutofit fontScale="70000" lnSpcReduction="20000"/>
+          </a:bodyPr>
+          <a:lstStyle/>
+          <a:p>
+            <a:pPr marL="0" indent="0">
+              <a:buNone/>
+            </a:pPr>
+            <a:r>
+              <a:rPr lang="en-US" sz="3000" dirty="0" smtClean="0"/>
+              <a:t>A </a:t>
+            </a:r>
+            <a:r>
+              <a:rPr lang="en-US" sz="3000" dirty="0"/>
+              <a:t>topic defines a how a bot conversation plays out.</a:t>
+            </a:r>
+          </a:p>
+          <a:p>
+            <a:pPr marL="0" indent="0">
+              <a:buNone/>
+            </a:pPr>
+            <a:r>
+              <a:rPr lang="en-US" sz="3000" dirty="0" smtClean="0"/>
+              <a:t>Topic components:</a:t>
+            </a:r>
+          </a:p>
+          <a:p>
+            <a:r>
+              <a:rPr lang="en-US" sz="3000" dirty="0" smtClean="0"/>
+              <a:t>Trigger phrases</a:t>
+            </a:r>
+            <a:endParaRPr lang="en-US" sz="3000" dirty="0"/>
+          </a:p>
+          <a:p>
+            <a:r>
+              <a:rPr lang="en-US" sz="3000" dirty="0" smtClean="0"/>
+              <a:t>Conversation </a:t>
+            </a:r>
+            <a:r>
+              <a:rPr lang="en-US" sz="3000" dirty="0"/>
+              <a:t>nodes.</a:t>
+            </a:r>
+          </a:p>
+          <a:p>
+            <a:pPr marL="0" indent="0">
+              <a:buNone/>
+            </a:pPr>
+            <a:endParaRPr lang="en-US" sz="3000" dirty="0" smtClean="0"/>
+          </a:p>
+          <a:p>
+            <a:pPr marL="0" indent="0">
+              <a:buNone/>
+            </a:pPr>
+            <a:r>
+              <a:rPr lang="en-US" sz="3000" dirty="0" smtClean="0"/>
+              <a:t>Topic takes Phrases/Keywords as Input and shows the relevant output defined by business.</a:t>
+            </a:r>
+          </a:p>
+          <a:p>
+            <a:pPr marL="0" indent="0">
+              <a:buNone/>
+            </a:pPr>
+            <a:endParaRPr lang="en-US" sz="3000" dirty="0"/>
+          </a:p>
+          <a:p>
+            <a:pPr marL="0" indent="0">
+              <a:buNone/>
+            </a:pPr>
+            <a:r>
+              <a:rPr lang="en-US" sz="3000" dirty="0" smtClean="0"/>
+              <a:t>For </a:t>
+            </a:r>
+            <a:r>
+              <a:rPr lang="en-US" sz="3000" dirty="0" err="1" smtClean="0"/>
+              <a:t>eg</a:t>
+            </a:r>
+            <a:r>
+              <a:rPr lang="en-US" sz="3000" dirty="0" smtClean="0"/>
+              <a:t>.,</a:t>
+            </a:r>
+            <a:r>
+              <a:rPr lang="en-US" sz="3000" dirty="0"/>
+              <a:t> </a:t>
+            </a:r>
+            <a:r>
+              <a:rPr lang="en-US" sz="3000" dirty="0" smtClean="0"/>
+              <a:t>Topic: Insurance Filing docs, requires phrases such as “prerequisite documents” that user in general give in chat, the bot will understand these phrases and will generate the business output that satisfies the user </a:t>
+            </a:r>
+            <a:r>
+              <a:rPr lang="en-US" sz="3000" dirty="0" err="1" smtClean="0"/>
+              <a:t>ie</a:t>
+            </a:r>
+            <a:r>
+              <a:rPr lang="en-US" sz="3000" dirty="0" smtClean="0"/>
+              <a:t>., List of proof documents in this case.</a:t>
+            </a:r>
+            <a:endParaRPr lang="en-US" sz="3200" dirty="0"/>
+          </a:p>
+          <a:p>
+            <a:pPr marL="0" indent="0">
+              <a:buNone/>
+            </a:pPr>
+            <a:r>
+              <a:rPr lang="en-US" dirty="0" smtClean="0"/>
+              <a:t>	</a:t>
+            </a:r>
+            <a:endParaRPr lang="en-US" dirty="0"/>
+          </a:p>
+        </p:txBody>
+      </p:sp>
+    </p:spTree>
+    <p:extLst>
+      <p:ext uri="{BB962C8B-B14F-4D97-AF65-F5344CB8AC3E}">
+        <p14:creationId xmlns:p14="http://schemas.microsoft.com/office/powerpoint/2010/main" val="3127813953"/>
+      </p:ext>
+    </p:extLst>
+  </p:cSld>
+  <p:clrMapOvr>
+    <a:masterClrMapping/>
+  </p:clrMapOvr>
+  <p:timing>
+    <p:tnLst>
+      <p:par>
+        <p:cTn id="1" dur="indefinite" restart="never" nodeType="tmRoot"/>
+      </p:par>
+    </p:tnLst>
+  </p:timing>
+</p:sld>
+</file>
+
+<file path=ppt/slides/slide11.xml><?xml version="1.0" encoding="utf-8"?>
+<p:sld xmlns:a="http://schemas.openxmlformats.org/drawingml/2006/main" xmlns:r="http://schemas.openxmlformats.org/officeDocument/2006/relationships" xmlns:p="http://schemas.openxmlformats.org/presentationml/2006/main">
+  <p:cSld>
+    <p:spTree>
+      <p:nvGrpSpPr>
+        <p:cNvPr id="1" name=""/>
+        <p:cNvGrpSpPr/>
+        <p:nvPr/>
+      </p:nvGrpSpPr>
+      <p:grpSpPr>
+        <a:xfrm>
+          <a:off x="0" y="0"/>
+          <a:ext cx="0" cy="0"/>
+          <a:chOff x="0" y="0"/>
+          <a:chExt cx="0" cy="0"/>
+        </a:xfrm>
+      </p:grpSpPr>
+      <p:sp>
+        <p:nvSpPr>
+          <p:cNvPr id="2" name="Title 1"/>
+          <p:cNvSpPr>
+            <a:spLocks noGrp="1"/>
+          </p:cNvSpPr>
+          <p:nvPr>
+            <p:ph type="title"/>
+          </p:nvPr>
+        </p:nvSpPr>
+        <p:spPr>
+          <a:xfrm>
+            <a:off x="3124321" y="0"/>
+            <a:ext cx="8596668" cy="1320800"/>
+          </a:xfrm>
+        </p:spPr>
+        <p:txBody>
+          <a:bodyPr>
+            <a:normAutofit/>
+          </a:bodyPr>
+          <a:lstStyle/>
+          <a:p>
+            <a:r>
+              <a:rPr lang="en-US" sz="5400" b="1" dirty="0" smtClean="0"/>
+              <a:t>Created </a:t>
+            </a:r>
+            <a:r>
+              <a:rPr lang="en-US" sz="5400" b="1" dirty="0"/>
+              <a:t>TOPICS</a:t>
+            </a:r>
+          </a:p>
+        </p:txBody>
+      </p:sp>
+      <p:pic>
+        <p:nvPicPr>
+          <p:cNvPr id="4" name="Picture 3"/>
+          <p:cNvPicPr>
+            <a:picLocks noChangeAspect="1"/>
+          </p:cNvPicPr>
+          <p:nvPr/>
+        </p:nvPicPr>
+        <p:blipFill>
+          <a:blip r:embed="rId2"/>
+          <a:stretch>
+            <a:fillRect/>
+          </a:stretch>
+        </p:blipFill>
+        <p:spPr>
+          <a:xfrm>
+            <a:off x="1581217" y="1197089"/>
+            <a:ext cx="8335515" cy="5660911"/>
           </a:xfrm>
           <a:prstGeom prst="rect">
             <a:avLst/>
@@ -12631,7 +12853,7 @@
 </p:sld>
 </file>
 
-<file path=ppt/slides/slide11.xml><?xml version="1.0" encoding="utf-8"?>
+<file path=ppt/slides/slide12.xml><?xml version="1.0" encoding="utf-8"?>
 <p:sld xmlns:a="http://schemas.openxmlformats.org/drawingml/2006/main" xmlns:r="http://schemas.openxmlformats.org/officeDocument/2006/relationships" xmlns:p="http://schemas.openxmlformats.org/presentationml/2006/main">
   <p:cSld>
     <p:spTree>
@@ -12722,7 +12944,7 @@
 </p:sld>
 </file>
 
-<file path=ppt/slides/slide12.xml><?xml version="1.0" encoding="utf-8"?>
+<file path=ppt/slides/slide13.xml><?xml version="1.0" encoding="utf-8"?>
 <p:sld xmlns:a="http://schemas.openxmlformats.org/drawingml/2006/main" xmlns:r="http://schemas.openxmlformats.org/officeDocument/2006/relationships" xmlns:p="http://schemas.openxmlformats.org/presentationml/2006/main">
   <p:cSld>
     <p:spTree>
@@ -12926,7 +13148,7 @@
 </p:sld>
 </file>
 
-<file path=ppt/slides/slide13.xml><?xml version="1.0" encoding="utf-8"?>
+<file path=ppt/slides/slide14.xml><?xml version="1.0" encoding="utf-8"?>
 <p:sld xmlns:a="http://schemas.openxmlformats.org/drawingml/2006/main" xmlns:r="http://schemas.openxmlformats.org/officeDocument/2006/relationships" xmlns:p="http://schemas.openxmlformats.org/presentationml/2006/main">
   <p:cSld>
     <p:spTree>
@@ -13129,7 +13351,7 @@
 </p:sld>
 </file>
 
-<file path=ppt/slides/slide14.xml><?xml version="1.0" encoding="utf-8"?>
+<file path=ppt/slides/slide15.xml><?xml version="1.0" encoding="utf-8"?>
 <p:sld xmlns:a="http://schemas.openxmlformats.org/drawingml/2006/main" xmlns:r="http://schemas.openxmlformats.org/officeDocument/2006/relationships" xmlns:p="http://schemas.openxmlformats.org/presentationml/2006/main">
   <p:cSld>
     <p:spTree>
@@ -13224,7 +13446,7 @@
 </p:sld>
 </file>
 
-<file path=ppt/slides/slide15.xml><?xml version="1.0" encoding="utf-8"?>
+<file path=ppt/slides/slide16.xml><?xml version="1.0" encoding="utf-8"?>
 <p:sld xmlns:a="http://schemas.openxmlformats.org/drawingml/2006/main" xmlns:r="http://schemas.openxmlformats.org/officeDocument/2006/relationships" xmlns:p="http://schemas.openxmlformats.org/presentationml/2006/main">
   <p:cSld>
     <p:spTree>
@@ -13352,7 +13574,7 @@
 </p:sld>
 </file>
 
-<file path=ppt/slides/slide16.xml><?xml version="1.0" encoding="utf-8"?>
+<file path=ppt/slides/slide17.xml><?xml version="1.0" encoding="utf-8"?>
 <p:sld xmlns:a="http://schemas.openxmlformats.org/drawingml/2006/main" xmlns:r="http://schemas.openxmlformats.org/officeDocument/2006/relationships" xmlns:p="http://schemas.openxmlformats.org/presentationml/2006/main">
   <p:cSld>
     <p:spTree>
@@ -13449,7 +13671,7 @@
 </p:sld>
 </file>
 
-<file path=ppt/slides/slide17.xml><?xml version="1.0" encoding="utf-8"?>
+<file path=ppt/slides/slide18.xml><?xml version="1.0" encoding="utf-8"?>
 <p:sld xmlns:a="http://schemas.openxmlformats.org/drawingml/2006/main" xmlns:r="http://schemas.openxmlformats.org/officeDocument/2006/relationships" xmlns:p="http://schemas.openxmlformats.org/presentationml/2006/main">
   <p:cSld>
     <p:spTree>
@@ -13540,7 +13762,7 @@
 </p:sld>
 </file>
 
-<file path=ppt/slides/slide18.xml><?xml version="1.0" encoding="utf-8"?>
+<file path=ppt/slides/slide19.xml><?xml version="1.0" encoding="utf-8"?>
 <p:sld xmlns:a="http://schemas.openxmlformats.org/drawingml/2006/main" xmlns:r="http://schemas.openxmlformats.org/officeDocument/2006/relationships" xmlns:p="http://schemas.openxmlformats.org/presentationml/2006/main">
   <p:cSld>
     <p:spTree>
@@ -13631,7 +13853,454 @@
 </p:sld>
 </file>
 
-<file path=ppt/slides/slide19.xml><?xml version="1.0" encoding="utf-8"?>
+<file path=ppt/slides/slide2.xml><?xml version="1.0" encoding="utf-8"?>
+<p:sld xmlns:a="http://schemas.openxmlformats.org/drawingml/2006/main" xmlns:r="http://schemas.openxmlformats.org/officeDocument/2006/relationships" xmlns:p="http://schemas.openxmlformats.org/presentationml/2006/main">
+  <p:cSld>
+    <p:spTree>
+      <p:nvGrpSpPr>
+        <p:cNvPr id="1" name=""/>
+        <p:cNvGrpSpPr/>
+        <p:nvPr/>
+      </p:nvGrpSpPr>
+      <p:grpSpPr>
+        <a:xfrm>
+          <a:off x="0" y="0"/>
+          <a:ext cx="0" cy="0"/>
+          <a:chOff x="0" y="0"/>
+          <a:chExt cx="0" cy="0"/>
+        </a:xfrm>
+      </p:grpSpPr>
+      <p:sp>
+        <p:nvSpPr>
+          <p:cNvPr id="2" name="Title 1"/>
+          <p:cNvSpPr>
+            <a:spLocks noGrp="1"/>
+          </p:cNvSpPr>
+          <p:nvPr>
+            <p:ph type="title"/>
+          </p:nvPr>
+        </p:nvSpPr>
+        <p:spPr>
+          <a:xfrm>
+            <a:off x="2460938" y="0"/>
+            <a:ext cx="9039896" cy="1708375"/>
+          </a:xfrm>
+        </p:spPr>
+        <p:txBody>
+          <a:bodyPr>
+            <a:normAutofit/>
+          </a:bodyPr>
+          <a:lstStyle/>
+          <a:p>
+            <a:r>
+              <a:rPr lang="en-US" sz="7300" b="1" dirty="0" smtClean="0"/>
+              <a:t>INTRODUCTION</a:t>
+            </a:r>
+            <a:endParaRPr lang="en-US" b="1" dirty="0"/>
+          </a:p>
+        </p:txBody>
+      </p:sp>
+      <p:sp>
+        <p:nvSpPr>
+          <p:cNvPr id="4" name="Content Placeholder 2"/>
+          <p:cNvSpPr>
+            <a:spLocks noGrp="1"/>
+          </p:cNvSpPr>
+          <p:nvPr>
+            <p:ph idx="1"/>
+          </p:nvPr>
+        </p:nvSpPr>
+        <p:spPr>
+          <a:xfrm>
+            <a:off x="1249252" y="1412161"/>
+            <a:ext cx="10393251" cy="1781800"/>
+          </a:xfrm>
+        </p:spPr>
+        <p:txBody>
+          <a:bodyPr>
+            <a:normAutofit/>
+          </a:bodyPr>
+          <a:lstStyle/>
+          <a:p>
+            <a:pPr marL="0" indent="0">
+              <a:buNone/>
+            </a:pPr>
+            <a:r>
+              <a:rPr lang="en-US" sz="2000" b="1" dirty="0" smtClean="0"/>
+              <a:t>Insure-You</a:t>
+            </a:r>
+            <a:r>
+              <a:rPr lang="en-US" sz="2000" dirty="0" smtClean="0"/>
+              <a:t> is a powerful Chatbot with </a:t>
+            </a:r>
+            <a:r>
+              <a:rPr lang="en-US" sz="2000" b="1" dirty="0">
+                <a:solidFill>
+                  <a:srgbClr val="FFFF00"/>
+                </a:solidFill>
+              </a:rPr>
+              <a:t>A</a:t>
+            </a:r>
+            <a:r>
+              <a:rPr lang="en-US" sz="2000" b="1" dirty="0" smtClean="0">
+                <a:solidFill>
+                  <a:srgbClr val="FFFF00"/>
+                </a:solidFill>
+              </a:rPr>
+              <a:t>ugmented </a:t>
+            </a:r>
+            <a:r>
+              <a:rPr lang="en-US" sz="2000" b="1" dirty="0">
+                <a:solidFill>
+                  <a:srgbClr val="FFFF00"/>
+                </a:solidFill>
+              </a:rPr>
+              <a:t>I</a:t>
+            </a:r>
+            <a:r>
+              <a:rPr lang="en-US" sz="2000" b="1" dirty="0" smtClean="0">
+                <a:solidFill>
+                  <a:srgbClr val="FFFF00"/>
+                </a:solidFill>
+              </a:rPr>
+              <a:t>ntelligence</a:t>
+            </a:r>
+            <a:r>
+              <a:rPr lang="en-US" sz="2000" dirty="0" smtClean="0"/>
+              <a:t>, initially developed using </a:t>
+            </a:r>
+            <a:r>
+              <a:rPr lang="en-US" sz="2000" b="1" dirty="0" smtClean="0">
+                <a:solidFill>
+                  <a:srgbClr val="FFFF00"/>
+                </a:solidFill>
+              </a:rPr>
+              <a:t>Azure IOT services </a:t>
+            </a:r>
+            <a:r>
+              <a:rPr lang="en-US" sz="2000" dirty="0" smtClean="0"/>
+              <a:t>and later has been integrated to </a:t>
+            </a:r>
+            <a:r>
+              <a:rPr lang="en-US" sz="2000" dirty="0" smtClean="0">
+                <a:solidFill>
+                  <a:srgbClr val="FFFF00"/>
+                </a:solidFill>
+              </a:rPr>
+              <a:t>Power-BI tool </a:t>
+            </a:r>
+            <a:r>
+              <a:rPr lang="en-US" sz="2000" dirty="0"/>
+              <a:t>with </a:t>
+            </a:r>
+            <a:r>
+              <a:rPr lang="en-US" sz="2000" b="1" dirty="0">
+                <a:solidFill>
+                  <a:srgbClr val="FFFF00"/>
+                </a:solidFill>
+              </a:rPr>
+              <a:t>Q &amp; A utility</a:t>
+            </a:r>
+            <a:r>
+              <a:rPr lang="en-US" sz="2000" dirty="0" smtClean="0"/>
+              <a:t>. It was developed in order to achieve the objective of </a:t>
+            </a:r>
+            <a:r>
+              <a:rPr lang="en-US" sz="2000" dirty="0"/>
+              <a:t>being </a:t>
+            </a:r>
+            <a:r>
+              <a:rPr lang="en-US" sz="2000" dirty="0" smtClean="0"/>
+              <a:t>informative towards the user and being a bot </a:t>
+            </a:r>
+            <a:r>
+              <a:rPr lang="en-US" sz="2000" dirty="0"/>
+              <a:t>that </a:t>
+            </a:r>
+            <a:r>
+              <a:rPr lang="en-US" sz="2000" dirty="0" smtClean="0"/>
+              <a:t>can infer insights out of any </a:t>
+            </a:r>
+            <a:r>
+              <a:rPr lang="en-US" sz="2000" dirty="0"/>
+              <a:t>given specific Insurance dataset</a:t>
+            </a:r>
+            <a:r>
+              <a:rPr lang="en-US" dirty="0" smtClean="0"/>
+              <a:t>. </a:t>
+            </a:r>
+            <a:r>
+              <a:rPr lang="en-US" sz="2000" dirty="0"/>
+              <a:t>Following are some </a:t>
+            </a:r>
+            <a:r>
+              <a:rPr lang="en-US" sz="2000" dirty="0" smtClean="0"/>
+              <a:t>of the capabilities </a:t>
+            </a:r>
+            <a:r>
+              <a:rPr lang="en-US" sz="2000" dirty="0"/>
+              <a:t>of our </a:t>
+            </a:r>
+            <a:r>
+              <a:rPr lang="en-US" sz="2000" dirty="0" smtClean="0"/>
+              <a:t>bot,</a:t>
+            </a:r>
+          </a:p>
+        </p:txBody>
+      </p:sp>
+      <p:sp>
+        <p:nvSpPr>
+          <p:cNvPr id="5" name="Content Placeholder 2"/>
+          <p:cNvSpPr txBox="1">
+            <a:spLocks/>
+          </p:cNvSpPr>
+          <p:nvPr/>
+        </p:nvSpPr>
+        <p:spPr>
+          <a:xfrm>
+            <a:off x="334851" y="3361387"/>
+            <a:ext cx="11050073" cy="5374339"/>
+          </a:xfrm>
+          <a:prstGeom prst="rect">
+            <a:avLst/>
+          </a:prstGeom>
+        </p:spPr>
+        <p:txBody>
+          <a:bodyPr vert="horz" lIns="91440" tIns="45720" rIns="91440" bIns="45720" rtlCol="0">
+            <a:normAutofit/>
+          </a:bodyPr>
+          <a:lstStyle>
+            <a:lvl1pPr marL="228600" indent="-228600" algn="l" defTabSz="914400" rtl="0" eaLnBrk="1" latinLnBrk="0" hangingPunct="1">
+              <a:lnSpc>
+                <a:spcPct val="120000"/>
+              </a:lnSpc>
+              <a:spcBef>
+                <a:spcPts val="1000"/>
+              </a:spcBef>
+              <a:buSzPct val="125000"/>
+              <a:buFont typeface="Arial" panose="020B0604020202020204" pitchFamily="34" charset="0"/>
+              <a:buChar char="•"/>
+              <a:defRPr sz="2400" kern="1200">
+                <a:solidFill>
+                  <a:schemeClr val="tx1"/>
+                </a:solidFill>
+                <a:latin typeface="+mn-lt"/>
+                <a:ea typeface="+mn-ea"/>
+                <a:cs typeface="+mn-cs"/>
+              </a:defRPr>
+            </a:lvl1pPr>
+            <a:lvl2pPr marL="685800" indent="-228600" algn="l" defTabSz="914400" rtl="0" eaLnBrk="1" latinLnBrk="0" hangingPunct="1">
+              <a:lnSpc>
+                <a:spcPct val="120000"/>
+              </a:lnSpc>
+              <a:spcBef>
+                <a:spcPts val="500"/>
+              </a:spcBef>
+              <a:buSzPct val="125000"/>
+              <a:buFont typeface="Arial" panose="020B0604020202020204" pitchFamily="34" charset="0"/>
+              <a:buChar char="•"/>
+              <a:defRPr sz="2000" kern="1200">
+                <a:solidFill>
+                  <a:schemeClr val="tx1"/>
+                </a:solidFill>
+                <a:latin typeface="+mn-lt"/>
+                <a:ea typeface="+mn-ea"/>
+                <a:cs typeface="+mn-cs"/>
+              </a:defRPr>
+            </a:lvl2pPr>
+            <a:lvl3pPr marL="1143000" indent="-228600" algn="l" defTabSz="914400" rtl="0" eaLnBrk="1" latinLnBrk="0" hangingPunct="1">
+              <a:lnSpc>
+                <a:spcPct val="120000"/>
+              </a:lnSpc>
+              <a:spcBef>
+                <a:spcPts val="500"/>
+              </a:spcBef>
+              <a:buSzPct val="125000"/>
+              <a:buFont typeface="Arial" panose="020B0604020202020204" pitchFamily="34" charset="0"/>
+              <a:buChar char="•"/>
+              <a:defRPr sz="1800" kern="1200">
+                <a:solidFill>
+                  <a:schemeClr val="tx1"/>
+                </a:solidFill>
+                <a:latin typeface="+mn-lt"/>
+                <a:ea typeface="+mn-ea"/>
+                <a:cs typeface="+mn-cs"/>
+              </a:defRPr>
+            </a:lvl3pPr>
+            <a:lvl4pPr marL="1600200" indent="-228600" algn="l" defTabSz="914400" rtl="0" eaLnBrk="1" latinLnBrk="0" hangingPunct="1">
+              <a:lnSpc>
+                <a:spcPct val="120000"/>
+              </a:lnSpc>
+              <a:spcBef>
+                <a:spcPts val="500"/>
+              </a:spcBef>
+              <a:buSzPct val="125000"/>
+              <a:buFont typeface="Arial" panose="020B0604020202020204" pitchFamily="34" charset="0"/>
+              <a:buChar char="•"/>
+              <a:defRPr sz="1600" kern="1200">
+                <a:solidFill>
+                  <a:schemeClr val="tx1"/>
+                </a:solidFill>
+                <a:latin typeface="+mn-lt"/>
+                <a:ea typeface="+mn-ea"/>
+                <a:cs typeface="+mn-cs"/>
+              </a:defRPr>
+            </a:lvl4pPr>
+            <a:lvl5pPr marL="2057400" indent="-228600" algn="l" defTabSz="914400" rtl="0" eaLnBrk="1" latinLnBrk="0" hangingPunct="1">
+              <a:lnSpc>
+                <a:spcPct val="120000"/>
+              </a:lnSpc>
+              <a:spcBef>
+                <a:spcPts val="500"/>
+              </a:spcBef>
+              <a:buSzPct val="125000"/>
+              <a:buFont typeface="Arial" panose="020B0604020202020204" pitchFamily="34" charset="0"/>
+              <a:buChar char="•"/>
+              <a:defRPr sz="1600" kern="1200">
+                <a:solidFill>
+                  <a:schemeClr val="tx1"/>
+                </a:solidFill>
+                <a:latin typeface="+mn-lt"/>
+                <a:ea typeface="+mn-ea"/>
+                <a:cs typeface="+mn-cs"/>
+              </a:defRPr>
+            </a:lvl5pPr>
+            <a:lvl6pPr marL="2514600" indent="-228600" algn="l" defTabSz="914400" rtl="0" eaLnBrk="1" latinLnBrk="0" hangingPunct="1">
+              <a:lnSpc>
+                <a:spcPct val="120000"/>
+              </a:lnSpc>
+              <a:spcBef>
+                <a:spcPts val="500"/>
+              </a:spcBef>
+              <a:buSzPct val="125000"/>
+              <a:buFont typeface="Arial" panose="020B0604020202020204" pitchFamily="34" charset="0"/>
+              <a:buChar char="•"/>
+              <a:defRPr sz="1400" kern="1200">
+                <a:solidFill>
+                  <a:schemeClr val="tx1"/>
+                </a:solidFill>
+                <a:latin typeface="+mn-lt"/>
+                <a:ea typeface="+mn-ea"/>
+                <a:cs typeface="+mn-cs"/>
+              </a:defRPr>
+            </a:lvl6pPr>
+            <a:lvl7pPr marL="2971800" indent="-228600" algn="l" defTabSz="914400" rtl="0" eaLnBrk="1" latinLnBrk="0" hangingPunct="1">
+              <a:lnSpc>
+                <a:spcPct val="120000"/>
+              </a:lnSpc>
+              <a:spcBef>
+                <a:spcPts val="500"/>
+              </a:spcBef>
+              <a:buSzPct val="125000"/>
+              <a:buFont typeface="Arial" panose="020B0604020202020204" pitchFamily="34" charset="0"/>
+              <a:buChar char="•"/>
+              <a:defRPr sz="1400" kern="1200">
+                <a:solidFill>
+                  <a:schemeClr val="tx1"/>
+                </a:solidFill>
+                <a:latin typeface="+mn-lt"/>
+                <a:ea typeface="+mn-ea"/>
+                <a:cs typeface="+mn-cs"/>
+              </a:defRPr>
+            </a:lvl7pPr>
+            <a:lvl8pPr marL="3429000" indent="-228600" algn="l" defTabSz="914400" rtl="0" eaLnBrk="1" latinLnBrk="0" hangingPunct="1">
+              <a:lnSpc>
+                <a:spcPct val="120000"/>
+              </a:lnSpc>
+              <a:spcBef>
+                <a:spcPts val="500"/>
+              </a:spcBef>
+              <a:buSzPct val="125000"/>
+              <a:buFont typeface="Arial" panose="020B0604020202020204" pitchFamily="34" charset="0"/>
+              <a:buChar char="•"/>
+              <a:defRPr sz="1400" kern="1200">
+                <a:solidFill>
+                  <a:schemeClr val="tx1"/>
+                </a:solidFill>
+                <a:latin typeface="+mn-lt"/>
+                <a:ea typeface="+mn-ea"/>
+                <a:cs typeface="+mn-cs"/>
+              </a:defRPr>
+            </a:lvl8pPr>
+            <a:lvl9pPr marL="3886200" indent="-228600" algn="l" defTabSz="914400" rtl="0" eaLnBrk="1" latinLnBrk="0" hangingPunct="1">
+              <a:lnSpc>
+                <a:spcPct val="120000"/>
+              </a:lnSpc>
+              <a:spcBef>
+                <a:spcPts val="500"/>
+              </a:spcBef>
+              <a:buSzPct val="125000"/>
+              <a:buFont typeface="Arial" panose="020B0604020202020204" pitchFamily="34" charset="0"/>
+              <a:buChar char="•"/>
+              <a:defRPr sz="1400" kern="1200">
+                <a:solidFill>
+                  <a:schemeClr val="tx1"/>
+                </a:solidFill>
+                <a:latin typeface="+mn-lt"/>
+                <a:ea typeface="+mn-ea"/>
+                <a:cs typeface="+mn-cs"/>
+              </a:defRPr>
+            </a:lvl9pPr>
+          </a:lstStyle>
+          <a:p>
+            <a:pPr lvl="2"/>
+            <a:r>
+              <a:rPr lang="en-US" sz="1600" dirty="0" smtClean="0"/>
+              <a:t>Able to answer few FAQ’s on Insurance domain knowledge based on the user defined keywords and also it can provide the Wikipedia page link of Insurance knowledge base.</a:t>
+            </a:r>
+          </a:p>
+          <a:p>
+            <a:pPr lvl="2"/>
+            <a:r>
+              <a:rPr lang="en-US" sz="1600" dirty="0" smtClean="0"/>
+              <a:t>Able to recommend certain insurance products based on the category that user falls in terms of age level.</a:t>
+            </a:r>
+          </a:p>
+          <a:p>
+            <a:pPr lvl="2"/>
+            <a:r>
+              <a:rPr lang="en-US" sz="1600" dirty="0" smtClean="0"/>
+              <a:t>Able to redirect user to organization link where he/she starts filing application on his own and then redirects the user to policy executive/agents for further process. </a:t>
+            </a:r>
+          </a:p>
+          <a:p>
+            <a:pPr lvl="2"/>
+            <a:r>
+              <a:rPr lang="en-US" sz="1600" dirty="0" smtClean="0"/>
+              <a:t>Also it can provide some general information like how many days the application process will take, what are the documents customer care will request to process the application, additional available insurance products, insurance companies with which the organization tie up.</a:t>
+            </a:r>
+          </a:p>
+          <a:p>
+            <a:pPr lvl="2"/>
+            <a:r>
+              <a:rPr lang="en-US" sz="1600" dirty="0" smtClean="0"/>
+              <a:t>Able  to aggregate the data and show the results , visualize the raw data/aggregate results to user in different charts like bar, scatter, pie, geographical map, word cloud, tree map etc.,</a:t>
+            </a:r>
+            <a:endParaRPr lang="en-US" sz="1600" dirty="0"/>
+          </a:p>
+        </p:txBody>
+      </p:sp>
+    </p:spTree>
+    <p:extLst>
+      <p:ext uri="{BB962C8B-B14F-4D97-AF65-F5344CB8AC3E}">
+        <p14:creationId xmlns:p14="http://schemas.microsoft.com/office/powerpoint/2010/main" val="304902209"/>
+      </p:ext>
+    </p:extLst>
+  </p:cSld>
+  <p:clrMapOvr>
+    <a:masterClrMapping/>
+  </p:clrMapOvr>
+  <p:timing>
+    <p:tnLst>
+      <p:par>
+        <p:cTn id="1" dur="indefinite" restart="never" nodeType="tmRoot"/>
+      </p:par>
+    </p:tnLst>
+  </p:timing>
+</p:sld>
+</file>
+
+<file path=ppt/slides/slide20.xml><?xml version="1.0" encoding="utf-8"?>
 <p:sld xmlns:a="http://schemas.openxmlformats.org/drawingml/2006/main" xmlns:r="http://schemas.openxmlformats.org/officeDocument/2006/relationships" xmlns:p="http://schemas.openxmlformats.org/presentationml/2006/main">
   <p:cSld>
     <p:spTree>
@@ -14544,454 +15213,7 @@
 </p:sld>
 </file>
 
-<file path=ppt/slides/slide2.xml><?xml version="1.0" encoding="utf-8"?>
-<p:sld xmlns:a="http://schemas.openxmlformats.org/drawingml/2006/main" xmlns:r="http://schemas.openxmlformats.org/officeDocument/2006/relationships" xmlns:p="http://schemas.openxmlformats.org/presentationml/2006/main">
-  <p:cSld>
-    <p:spTree>
-      <p:nvGrpSpPr>
-        <p:cNvPr id="1" name=""/>
-        <p:cNvGrpSpPr/>
-        <p:nvPr/>
-      </p:nvGrpSpPr>
-      <p:grpSpPr>
-        <a:xfrm>
-          <a:off x="0" y="0"/>
-          <a:ext cx="0" cy="0"/>
-          <a:chOff x="0" y="0"/>
-          <a:chExt cx="0" cy="0"/>
-        </a:xfrm>
-      </p:grpSpPr>
-      <p:sp>
-        <p:nvSpPr>
-          <p:cNvPr id="2" name="Title 1"/>
-          <p:cNvSpPr>
-            <a:spLocks noGrp="1"/>
-          </p:cNvSpPr>
-          <p:nvPr>
-            <p:ph type="title"/>
-          </p:nvPr>
-        </p:nvSpPr>
-        <p:spPr>
-          <a:xfrm>
-            <a:off x="2460938" y="0"/>
-            <a:ext cx="9039896" cy="1708375"/>
-          </a:xfrm>
-        </p:spPr>
-        <p:txBody>
-          <a:bodyPr>
-            <a:normAutofit/>
-          </a:bodyPr>
-          <a:lstStyle/>
-          <a:p>
-            <a:r>
-              <a:rPr lang="en-US" sz="7300" b="1" dirty="0" smtClean="0"/>
-              <a:t>INTRODUCTION</a:t>
-            </a:r>
-            <a:endParaRPr lang="en-US" b="1" dirty="0"/>
-          </a:p>
-        </p:txBody>
-      </p:sp>
-      <p:sp>
-        <p:nvSpPr>
-          <p:cNvPr id="4" name="Content Placeholder 2"/>
-          <p:cNvSpPr>
-            <a:spLocks noGrp="1"/>
-          </p:cNvSpPr>
-          <p:nvPr>
-            <p:ph idx="1"/>
-          </p:nvPr>
-        </p:nvSpPr>
-        <p:spPr>
-          <a:xfrm>
-            <a:off x="1249252" y="1412161"/>
-            <a:ext cx="10393251" cy="1781800"/>
-          </a:xfrm>
-        </p:spPr>
-        <p:txBody>
-          <a:bodyPr>
-            <a:normAutofit/>
-          </a:bodyPr>
-          <a:lstStyle/>
-          <a:p>
-            <a:pPr marL="0" indent="0">
-              <a:buNone/>
-            </a:pPr>
-            <a:r>
-              <a:rPr lang="en-US" sz="2000" b="1" dirty="0" smtClean="0"/>
-              <a:t>Insure-You</a:t>
-            </a:r>
-            <a:r>
-              <a:rPr lang="en-US" sz="2000" dirty="0" smtClean="0"/>
-              <a:t> is a powerful Chatbot with </a:t>
-            </a:r>
-            <a:r>
-              <a:rPr lang="en-US" sz="2000" b="1" dirty="0">
-                <a:solidFill>
-                  <a:srgbClr val="FFFF00"/>
-                </a:solidFill>
-              </a:rPr>
-              <a:t>A</a:t>
-            </a:r>
-            <a:r>
-              <a:rPr lang="en-US" sz="2000" b="1" dirty="0" smtClean="0">
-                <a:solidFill>
-                  <a:srgbClr val="FFFF00"/>
-                </a:solidFill>
-              </a:rPr>
-              <a:t>ugmented </a:t>
-            </a:r>
-            <a:r>
-              <a:rPr lang="en-US" sz="2000" b="1" dirty="0">
-                <a:solidFill>
-                  <a:srgbClr val="FFFF00"/>
-                </a:solidFill>
-              </a:rPr>
-              <a:t>I</a:t>
-            </a:r>
-            <a:r>
-              <a:rPr lang="en-US" sz="2000" b="1" dirty="0" smtClean="0">
-                <a:solidFill>
-                  <a:srgbClr val="FFFF00"/>
-                </a:solidFill>
-              </a:rPr>
-              <a:t>ntelligence</a:t>
-            </a:r>
-            <a:r>
-              <a:rPr lang="en-US" sz="2000" dirty="0" smtClean="0"/>
-              <a:t>, initially developed using </a:t>
-            </a:r>
-            <a:r>
-              <a:rPr lang="en-US" sz="2000" b="1" dirty="0" smtClean="0">
-                <a:solidFill>
-                  <a:srgbClr val="FFFF00"/>
-                </a:solidFill>
-              </a:rPr>
-              <a:t>Azure IOT services </a:t>
-            </a:r>
-            <a:r>
-              <a:rPr lang="en-US" sz="2000" dirty="0" smtClean="0"/>
-              <a:t>and later has been integrated to </a:t>
-            </a:r>
-            <a:r>
-              <a:rPr lang="en-US" sz="2000" dirty="0" smtClean="0">
-                <a:solidFill>
-                  <a:srgbClr val="FFFF00"/>
-                </a:solidFill>
-              </a:rPr>
-              <a:t>Power-BI tool </a:t>
-            </a:r>
-            <a:r>
-              <a:rPr lang="en-US" sz="2000" dirty="0"/>
-              <a:t>with </a:t>
-            </a:r>
-            <a:r>
-              <a:rPr lang="en-US" sz="2000" b="1" dirty="0">
-                <a:solidFill>
-                  <a:srgbClr val="FFFF00"/>
-                </a:solidFill>
-              </a:rPr>
-              <a:t>Q &amp; A utility</a:t>
-            </a:r>
-            <a:r>
-              <a:rPr lang="en-US" sz="2000" dirty="0" smtClean="0"/>
-              <a:t>. It was developed in order to achieve the objective of </a:t>
-            </a:r>
-            <a:r>
-              <a:rPr lang="en-US" sz="2000" dirty="0"/>
-              <a:t>being </a:t>
-            </a:r>
-            <a:r>
-              <a:rPr lang="en-US" sz="2000" dirty="0" smtClean="0"/>
-              <a:t>informative towards the user and being a bot </a:t>
-            </a:r>
-            <a:r>
-              <a:rPr lang="en-US" sz="2000" dirty="0"/>
-              <a:t>that </a:t>
-            </a:r>
-            <a:r>
-              <a:rPr lang="en-US" sz="2000" dirty="0" smtClean="0"/>
-              <a:t>can infer insights out of any </a:t>
-            </a:r>
-            <a:r>
-              <a:rPr lang="en-US" sz="2000" dirty="0"/>
-              <a:t>given specific Insurance dataset</a:t>
-            </a:r>
-            <a:r>
-              <a:rPr lang="en-US" dirty="0" smtClean="0"/>
-              <a:t>. </a:t>
-            </a:r>
-            <a:r>
-              <a:rPr lang="en-US" sz="2000" dirty="0"/>
-              <a:t>Following are some </a:t>
-            </a:r>
-            <a:r>
-              <a:rPr lang="en-US" sz="2000" dirty="0" smtClean="0"/>
-              <a:t>of the capabilities </a:t>
-            </a:r>
-            <a:r>
-              <a:rPr lang="en-US" sz="2000" dirty="0"/>
-              <a:t>of our </a:t>
-            </a:r>
-            <a:r>
-              <a:rPr lang="en-US" sz="2000" dirty="0" smtClean="0"/>
-              <a:t>bot,</a:t>
-            </a:r>
-          </a:p>
-        </p:txBody>
-      </p:sp>
-      <p:sp>
-        <p:nvSpPr>
-          <p:cNvPr id="5" name="Content Placeholder 2"/>
-          <p:cNvSpPr txBox="1">
-            <a:spLocks/>
-          </p:cNvSpPr>
-          <p:nvPr/>
-        </p:nvSpPr>
-        <p:spPr>
-          <a:xfrm>
-            <a:off x="334851" y="3361387"/>
-            <a:ext cx="11050073" cy="5374339"/>
-          </a:xfrm>
-          <a:prstGeom prst="rect">
-            <a:avLst/>
-          </a:prstGeom>
-        </p:spPr>
-        <p:txBody>
-          <a:bodyPr vert="horz" lIns="91440" tIns="45720" rIns="91440" bIns="45720" rtlCol="0">
-            <a:normAutofit/>
-          </a:bodyPr>
-          <a:lstStyle>
-            <a:lvl1pPr marL="228600" indent="-228600" algn="l" defTabSz="914400" rtl="0" eaLnBrk="1" latinLnBrk="0" hangingPunct="1">
-              <a:lnSpc>
-                <a:spcPct val="120000"/>
-              </a:lnSpc>
-              <a:spcBef>
-                <a:spcPts val="1000"/>
-              </a:spcBef>
-              <a:buSzPct val="125000"/>
-              <a:buFont typeface="Arial" panose="020B0604020202020204" pitchFamily="34" charset="0"/>
-              <a:buChar char="•"/>
-              <a:defRPr sz="2400" kern="1200">
-                <a:solidFill>
-                  <a:schemeClr val="tx1"/>
-                </a:solidFill>
-                <a:latin typeface="+mn-lt"/>
-                <a:ea typeface="+mn-ea"/>
-                <a:cs typeface="+mn-cs"/>
-              </a:defRPr>
-            </a:lvl1pPr>
-            <a:lvl2pPr marL="685800" indent="-228600" algn="l" defTabSz="914400" rtl="0" eaLnBrk="1" latinLnBrk="0" hangingPunct="1">
-              <a:lnSpc>
-                <a:spcPct val="120000"/>
-              </a:lnSpc>
-              <a:spcBef>
-                <a:spcPts val="500"/>
-              </a:spcBef>
-              <a:buSzPct val="125000"/>
-              <a:buFont typeface="Arial" panose="020B0604020202020204" pitchFamily="34" charset="0"/>
-              <a:buChar char="•"/>
-              <a:defRPr sz="2000" kern="1200">
-                <a:solidFill>
-                  <a:schemeClr val="tx1"/>
-                </a:solidFill>
-                <a:latin typeface="+mn-lt"/>
-                <a:ea typeface="+mn-ea"/>
-                <a:cs typeface="+mn-cs"/>
-              </a:defRPr>
-            </a:lvl2pPr>
-            <a:lvl3pPr marL="1143000" indent="-228600" algn="l" defTabSz="914400" rtl="0" eaLnBrk="1" latinLnBrk="0" hangingPunct="1">
-              <a:lnSpc>
-                <a:spcPct val="120000"/>
-              </a:lnSpc>
-              <a:spcBef>
-                <a:spcPts val="500"/>
-              </a:spcBef>
-              <a:buSzPct val="125000"/>
-              <a:buFont typeface="Arial" panose="020B0604020202020204" pitchFamily="34" charset="0"/>
-              <a:buChar char="•"/>
-              <a:defRPr sz="1800" kern="1200">
-                <a:solidFill>
-                  <a:schemeClr val="tx1"/>
-                </a:solidFill>
-                <a:latin typeface="+mn-lt"/>
-                <a:ea typeface="+mn-ea"/>
-                <a:cs typeface="+mn-cs"/>
-              </a:defRPr>
-            </a:lvl3pPr>
-            <a:lvl4pPr marL="1600200" indent="-228600" algn="l" defTabSz="914400" rtl="0" eaLnBrk="1" latinLnBrk="0" hangingPunct="1">
-              <a:lnSpc>
-                <a:spcPct val="120000"/>
-              </a:lnSpc>
-              <a:spcBef>
-                <a:spcPts val="500"/>
-              </a:spcBef>
-              <a:buSzPct val="125000"/>
-              <a:buFont typeface="Arial" panose="020B0604020202020204" pitchFamily="34" charset="0"/>
-              <a:buChar char="•"/>
-              <a:defRPr sz="1600" kern="1200">
-                <a:solidFill>
-                  <a:schemeClr val="tx1"/>
-                </a:solidFill>
-                <a:latin typeface="+mn-lt"/>
-                <a:ea typeface="+mn-ea"/>
-                <a:cs typeface="+mn-cs"/>
-              </a:defRPr>
-            </a:lvl4pPr>
-            <a:lvl5pPr marL="2057400" indent="-228600" algn="l" defTabSz="914400" rtl="0" eaLnBrk="1" latinLnBrk="0" hangingPunct="1">
-              <a:lnSpc>
-                <a:spcPct val="120000"/>
-              </a:lnSpc>
-              <a:spcBef>
-                <a:spcPts val="500"/>
-              </a:spcBef>
-              <a:buSzPct val="125000"/>
-              <a:buFont typeface="Arial" panose="020B0604020202020204" pitchFamily="34" charset="0"/>
-              <a:buChar char="•"/>
-              <a:defRPr sz="1600" kern="1200">
-                <a:solidFill>
-                  <a:schemeClr val="tx1"/>
-                </a:solidFill>
-                <a:latin typeface="+mn-lt"/>
-                <a:ea typeface="+mn-ea"/>
-                <a:cs typeface="+mn-cs"/>
-              </a:defRPr>
-            </a:lvl5pPr>
-            <a:lvl6pPr marL="2514600" indent="-228600" algn="l" defTabSz="914400" rtl="0" eaLnBrk="1" latinLnBrk="0" hangingPunct="1">
-              <a:lnSpc>
-                <a:spcPct val="120000"/>
-              </a:lnSpc>
-              <a:spcBef>
-                <a:spcPts val="500"/>
-              </a:spcBef>
-              <a:buSzPct val="125000"/>
-              <a:buFont typeface="Arial" panose="020B0604020202020204" pitchFamily="34" charset="0"/>
-              <a:buChar char="•"/>
-              <a:defRPr sz="1400" kern="1200">
-                <a:solidFill>
-                  <a:schemeClr val="tx1"/>
-                </a:solidFill>
-                <a:latin typeface="+mn-lt"/>
-                <a:ea typeface="+mn-ea"/>
-                <a:cs typeface="+mn-cs"/>
-              </a:defRPr>
-            </a:lvl6pPr>
-            <a:lvl7pPr marL="2971800" indent="-228600" algn="l" defTabSz="914400" rtl="0" eaLnBrk="1" latinLnBrk="0" hangingPunct="1">
-              <a:lnSpc>
-                <a:spcPct val="120000"/>
-              </a:lnSpc>
-              <a:spcBef>
-                <a:spcPts val="500"/>
-              </a:spcBef>
-              <a:buSzPct val="125000"/>
-              <a:buFont typeface="Arial" panose="020B0604020202020204" pitchFamily="34" charset="0"/>
-              <a:buChar char="•"/>
-              <a:defRPr sz="1400" kern="1200">
-                <a:solidFill>
-                  <a:schemeClr val="tx1"/>
-                </a:solidFill>
-                <a:latin typeface="+mn-lt"/>
-                <a:ea typeface="+mn-ea"/>
-                <a:cs typeface="+mn-cs"/>
-              </a:defRPr>
-            </a:lvl7pPr>
-            <a:lvl8pPr marL="3429000" indent="-228600" algn="l" defTabSz="914400" rtl="0" eaLnBrk="1" latinLnBrk="0" hangingPunct="1">
-              <a:lnSpc>
-                <a:spcPct val="120000"/>
-              </a:lnSpc>
-              <a:spcBef>
-                <a:spcPts val="500"/>
-              </a:spcBef>
-              <a:buSzPct val="125000"/>
-              <a:buFont typeface="Arial" panose="020B0604020202020204" pitchFamily="34" charset="0"/>
-              <a:buChar char="•"/>
-              <a:defRPr sz="1400" kern="1200">
-                <a:solidFill>
-                  <a:schemeClr val="tx1"/>
-                </a:solidFill>
-                <a:latin typeface="+mn-lt"/>
-                <a:ea typeface="+mn-ea"/>
-                <a:cs typeface="+mn-cs"/>
-              </a:defRPr>
-            </a:lvl8pPr>
-            <a:lvl9pPr marL="3886200" indent="-228600" algn="l" defTabSz="914400" rtl="0" eaLnBrk="1" latinLnBrk="0" hangingPunct="1">
-              <a:lnSpc>
-                <a:spcPct val="120000"/>
-              </a:lnSpc>
-              <a:spcBef>
-                <a:spcPts val="500"/>
-              </a:spcBef>
-              <a:buSzPct val="125000"/>
-              <a:buFont typeface="Arial" panose="020B0604020202020204" pitchFamily="34" charset="0"/>
-              <a:buChar char="•"/>
-              <a:defRPr sz="1400" kern="1200">
-                <a:solidFill>
-                  <a:schemeClr val="tx1"/>
-                </a:solidFill>
-                <a:latin typeface="+mn-lt"/>
-                <a:ea typeface="+mn-ea"/>
-                <a:cs typeface="+mn-cs"/>
-              </a:defRPr>
-            </a:lvl9pPr>
-          </a:lstStyle>
-          <a:p>
-            <a:pPr lvl="2"/>
-            <a:r>
-              <a:rPr lang="en-US" sz="1600" dirty="0" smtClean="0"/>
-              <a:t>Able to answer few FAQ’s on Insurance domain knowledge based on the user defined keywords and also it can provide the Wikipedia page link of Insurance knowledge base.</a:t>
-            </a:r>
-          </a:p>
-          <a:p>
-            <a:pPr lvl="2"/>
-            <a:r>
-              <a:rPr lang="en-US" sz="1600" dirty="0" smtClean="0"/>
-              <a:t>Able to recommend certain insurance products based on the category that user falls in terms of age level.</a:t>
-            </a:r>
-          </a:p>
-          <a:p>
-            <a:pPr lvl="2"/>
-            <a:r>
-              <a:rPr lang="en-US" sz="1600" dirty="0" smtClean="0"/>
-              <a:t>Able to redirect user to organization link where he/she starts filing application on his own and then redirects the user to policy executive/agents for further process. </a:t>
-            </a:r>
-          </a:p>
-          <a:p>
-            <a:pPr lvl="2"/>
-            <a:r>
-              <a:rPr lang="en-US" sz="1600" dirty="0" smtClean="0"/>
-              <a:t>Also it can provide some general information like how many days the application process will take, what are the documents customer care will request to process the application, additional available insurance products, insurance companies with which the organization tie up.</a:t>
-            </a:r>
-          </a:p>
-          <a:p>
-            <a:pPr lvl="2"/>
-            <a:r>
-              <a:rPr lang="en-US" sz="1600" dirty="0" smtClean="0"/>
-              <a:t>Able  to aggregate the data and show the results , visualize the raw data/aggregate results to user in different charts like bar, scatter, pie, geographical map, word cloud, tree map etc.,</a:t>
-            </a:r>
-            <a:endParaRPr lang="en-US" sz="1600" dirty="0"/>
-          </a:p>
-        </p:txBody>
-      </p:sp>
-    </p:spTree>
-    <p:extLst>
-      <p:ext uri="{BB962C8B-B14F-4D97-AF65-F5344CB8AC3E}">
-        <p14:creationId xmlns:p14="http://schemas.microsoft.com/office/powerpoint/2010/main" val="304902209"/>
-      </p:ext>
-    </p:extLst>
-  </p:cSld>
-  <p:clrMapOvr>
-    <a:masterClrMapping/>
-  </p:clrMapOvr>
-  <p:timing>
-    <p:tnLst>
-      <p:par>
-        <p:cTn id="1" dur="indefinite" restart="never" nodeType="tmRoot"/>
-      </p:par>
-    </p:tnLst>
-  </p:timing>
-</p:sld>
-</file>
-
-<file path=ppt/slides/slide20.xml><?xml version="1.0" encoding="utf-8"?>
+<file path=ppt/slides/slide21.xml><?xml version="1.0" encoding="utf-8"?>
 <p:sld xmlns:a="http://schemas.openxmlformats.org/drawingml/2006/main" xmlns:r="http://schemas.openxmlformats.org/officeDocument/2006/relationships" xmlns:p="http://schemas.openxmlformats.org/presentationml/2006/main">
   <p:cSld>
     <p:spTree>
@@ -16481,7 +16703,7 @@
         </p:nvSpPr>
         <p:spPr>
           <a:xfrm>
-            <a:off x="3415048" y="107549"/>
+            <a:off x="1676400" y="134596"/>
             <a:ext cx="10515600" cy="1325563"/>
           </a:xfrm>
         </p:spPr>
@@ -16492,10 +16714,18 @@
           <a:lstStyle/>
           <a:p>
             <a:r>
-              <a:rPr lang="en-US" sz="4800" b="1" dirty="0" smtClean="0"/>
-              <a:t>DIALOG FLOW</a:t>
-            </a:r>
-            <a:endParaRPr lang="en-US" sz="4800" b="1" dirty="0"/>
+              <a:rPr lang="en-US" sz="5400" b="1" dirty="0" smtClean="0"/>
+              <a:t>VIRTUAL AGENT </a:t>
+            </a:r>
+            <a:r>
+              <a:rPr lang="en-US" sz="5400" b="1" dirty="0" smtClean="0"/>
+              <a:t>DIALOG </a:t>
+            </a:r>
+            <a:r>
+              <a:rPr lang="en-US" sz="5400" b="1" dirty="0" smtClean="0"/>
+              <a:t>FLOW</a:t>
+            </a:r>
+            <a:endParaRPr lang="en-US" sz="5400" b="1" dirty="0"/>
           </a:p>
         </p:txBody>
       </p:sp>
@@ -16521,7 +16751,7 @@
           <a:graphicData uri="http://schemas.openxmlformats.org/presentationml/2006/ole">
             <mc:AlternateContent xmlns:mc="http://schemas.openxmlformats.org/markup-compatibility/2006">
               <mc:Choice xmlns:v="urn:schemas-microsoft-com:vml" Requires="v">
-                <p:oleObj spid="_x0000_s1845" name="Packager Shell Object" showAsIcon="1" r:id="rId3" imgW="914400" imgH="771480" progId="Package">
+                <p:oleObj spid="_x0000_s1939" name="Packager Shell Object" showAsIcon="1" r:id="rId3" imgW="914400" imgH="771480" progId="Package">
                   <p:embed/>
                 </p:oleObj>
               </mc:Choice>
@@ -16578,7 +16808,7 @@
           <a:graphicData uri="http://schemas.openxmlformats.org/presentationml/2006/ole">
             <mc:AlternateContent xmlns:mc="http://schemas.openxmlformats.org/markup-compatibility/2006">
               <mc:Choice xmlns:v="urn:schemas-microsoft-com:vml" Requires="v">
-                <p:oleObj spid="_x0000_s1846" name="Packager Shell Object" showAsIcon="1" r:id="rId5" imgW="914400" imgH="771480" progId="Package">
+                <p:oleObj spid="_x0000_s1940" name="Packager Shell Object" showAsIcon="1" r:id="rId5" imgW="914400" imgH="771480" progId="Package">
                   <p:embed/>
                 </p:oleObj>
               </mc:Choice>
@@ -16904,6 +17134,103 @@
         </p:nvSpPr>
         <p:spPr>
           <a:xfrm>
+            <a:off x="2346101" y="5807"/>
+            <a:ext cx="10515600" cy="1325563"/>
+          </a:xfrm>
+        </p:spPr>
+        <p:txBody>
+          <a:bodyPr>
+            <a:normAutofit/>
+          </a:bodyPr>
+          <a:lstStyle/>
+          <a:p>
+            <a:r>
+              <a:rPr lang="en-US" sz="5400" b="1" dirty="0" smtClean="0"/>
+              <a:t>PROJECT ARCHITECTURE</a:t>
+            </a:r>
+            <a:endParaRPr lang="en-US" sz="5400" b="1" dirty="0"/>
+          </a:p>
+        </p:txBody>
+      </p:sp>
+      <p:pic>
+        <p:nvPicPr>
+          <p:cNvPr id="7" name="Picture 6"/>
+          <p:cNvPicPr>
+            <a:picLocks noChangeAspect="1"/>
+          </p:cNvPicPr>
+          <p:nvPr/>
+        </p:nvPicPr>
+        <p:blipFill>
+          <a:blip r:embed="rId2">
+            <a:extLst>
+              <a:ext uri="{28A0092B-C50C-407E-A947-70E740481C1C}">
+                <a14:useLocalDpi xmlns:a14="http://schemas.microsoft.com/office/drawing/2010/main" val="0"/>
+              </a:ext>
+            </a:extLst>
+          </a:blip>
+          <a:stretch>
+            <a:fillRect/>
+          </a:stretch>
+        </p:blipFill>
+        <p:spPr>
+          <a:xfrm>
+            <a:off x="1017432" y="1331370"/>
+            <a:ext cx="10367492" cy="5194808"/>
+          </a:xfrm>
+          <a:prstGeom prst="rect">
+            <a:avLst/>
+          </a:prstGeom>
+        </p:spPr>
+      </p:pic>
+    </p:spTree>
+    <p:extLst>
+      <p:ext uri="{BB962C8B-B14F-4D97-AF65-F5344CB8AC3E}">
+        <p14:creationId xmlns:p14="http://schemas.microsoft.com/office/powerpoint/2010/main" val="4235015305"/>
+      </p:ext>
+    </p:extLst>
+  </p:cSld>
+  <p:clrMapOvr>
+    <a:masterClrMapping/>
+  </p:clrMapOvr>
+  <p:timing>
+    <p:tnLst>
+      <p:par>
+        <p:cTn id="1" dur="indefinite" restart="never" nodeType="tmRoot"/>
+      </p:par>
+    </p:tnLst>
+  </p:timing>
+</p:sld>
+</file>
+
+<file path=ppt/slides/slide8.xml><?xml version="1.0" encoding="utf-8"?>
+<p:sld xmlns:a="http://schemas.openxmlformats.org/drawingml/2006/main" xmlns:r="http://schemas.openxmlformats.org/officeDocument/2006/relationships" xmlns:p="http://schemas.openxmlformats.org/presentationml/2006/main">
+  <p:cSld>
+    <p:spTree>
+      <p:nvGrpSpPr>
+        <p:cNvPr id="1" name=""/>
+        <p:cNvGrpSpPr/>
+        <p:nvPr/>
+      </p:nvGrpSpPr>
+      <p:grpSpPr>
+        <a:xfrm>
+          <a:off x="0" y="0"/>
+          <a:ext cx="0" cy="0"/>
+          <a:chOff x="0" y="0"/>
+          <a:chExt cx="0" cy="0"/>
+        </a:xfrm>
+      </p:grpSpPr>
+      <p:sp>
+        <p:nvSpPr>
+          <p:cNvPr id="2" name="Title 1"/>
+          <p:cNvSpPr>
+            <a:spLocks noGrp="1"/>
+          </p:cNvSpPr>
+          <p:nvPr>
+            <p:ph type="title"/>
+          </p:nvPr>
+        </p:nvSpPr>
+        <p:spPr>
+          <a:xfrm>
             <a:off x="1236372" y="141668"/>
             <a:ext cx="10583771" cy="1478570"/>
           </a:xfrm>
@@ -16983,7 +17310,7 @@
 </p:sld>
 </file>
 
-<file path=ppt/slides/slide8.xml><?xml version="1.0" encoding="utf-8"?>
+<file path=ppt/slides/slide9.xml><?xml version="1.0" encoding="utf-8"?>
 <p:sld xmlns:a="http://schemas.openxmlformats.org/drawingml/2006/main" xmlns:r="http://schemas.openxmlformats.org/officeDocument/2006/relationships" xmlns:p="http://schemas.openxmlformats.org/presentationml/2006/main">
   <p:cSld>
     <p:spTree>
@@ -17124,224 +17451,6 @@
     <p:extLst>
       <p:ext uri="{BB962C8B-B14F-4D97-AF65-F5344CB8AC3E}">
         <p14:creationId xmlns:p14="http://schemas.microsoft.com/office/powerpoint/2010/main" val="1360878001"/>
-      </p:ext>
-    </p:extLst>
-  </p:cSld>
-  <p:clrMapOvr>
-    <a:masterClrMapping/>
-  </p:clrMapOvr>
-  <p:timing>
-    <p:tnLst>
-      <p:par>
-        <p:cTn id="1" dur="indefinite" restart="never" nodeType="tmRoot"/>
-      </p:par>
-    </p:tnLst>
-  </p:timing>
-</p:sld>
-</file>
-
-<file path=ppt/slides/slide9.xml><?xml version="1.0" encoding="utf-8"?>
-<p:sld xmlns:a="http://schemas.openxmlformats.org/drawingml/2006/main" xmlns:r="http://schemas.openxmlformats.org/officeDocument/2006/relationships" xmlns:p="http://schemas.openxmlformats.org/presentationml/2006/main">
-  <p:cSld>
-    <p:spTree>
-      <p:nvGrpSpPr>
-        <p:cNvPr id="1" name=""/>
-        <p:cNvGrpSpPr/>
-        <p:nvPr/>
-      </p:nvGrpSpPr>
-      <p:grpSpPr>
-        <a:xfrm>
-          <a:off x="0" y="0"/>
-          <a:ext cx="0" cy="0"/>
-          <a:chOff x="0" y="0"/>
-          <a:chExt cx="0" cy="0"/>
-        </a:xfrm>
-      </p:grpSpPr>
-      <p:sp>
-        <p:nvSpPr>
-          <p:cNvPr id="2" name="Title 1"/>
-          <p:cNvSpPr>
-            <a:spLocks noGrp="1"/>
-          </p:cNvSpPr>
-          <p:nvPr>
-            <p:ph type="title"/>
-          </p:nvPr>
-        </p:nvSpPr>
-        <p:spPr>
-          <a:xfrm>
-            <a:off x="4100174" y="-132366"/>
-            <a:ext cx="8596668" cy="1320800"/>
-          </a:xfrm>
-        </p:spPr>
-        <p:txBody>
-          <a:bodyPr>
-            <a:normAutofit/>
-          </a:bodyPr>
-          <a:lstStyle/>
-          <a:p>
-            <a:r>
-              <a:rPr lang="en-US" sz="5400" b="1" dirty="0" smtClean="0"/>
-              <a:t>TOPICs</a:t>
-            </a:r>
-            <a:endParaRPr lang="en-US" sz="4400" b="1" dirty="0"/>
-          </a:p>
-        </p:txBody>
-      </p:sp>
-      <p:pic>
-        <p:nvPicPr>
-          <p:cNvPr id="3" name="Picture 2"/>
-          <p:cNvPicPr>
-            <a:picLocks noChangeAspect="1"/>
-          </p:cNvPicPr>
-          <p:nvPr/>
-        </p:nvPicPr>
-        <p:blipFill>
-          <a:blip r:embed="rId2"/>
-          <a:stretch>
-            <a:fillRect/>
-          </a:stretch>
-        </p:blipFill>
-        <p:spPr>
-          <a:xfrm>
-            <a:off x="7094512" y="1056068"/>
-            <a:ext cx="4135543" cy="5633793"/>
-          </a:xfrm>
-          <a:prstGeom prst="rect">
-            <a:avLst/>
-          </a:prstGeom>
-        </p:spPr>
-      </p:pic>
-      <p:sp>
-        <p:nvSpPr>
-          <p:cNvPr id="6" name="Content Placeholder 2"/>
-          <p:cNvSpPr>
-            <a:spLocks noGrp="1"/>
-          </p:cNvSpPr>
-          <p:nvPr>
-            <p:ph idx="1"/>
-          </p:nvPr>
-        </p:nvSpPr>
-        <p:spPr>
-          <a:xfrm>
-            <a:off x="1105836" y="1188434"/>
-            <a:ext cx="5988676" cy="5633793"/>
-          </a:xfrm>
-        </p:spPr>
-        <p:txBody>
-          <a:bodyPr>
-            <a:normAutofit fontScale="70000" lnSpcReduction="20000"/>
-          </a:bodyPr>
-          <a:lstStyle/>
-          <a:p>
-            <a:pPr marL="0" indent="0">
-              <a:buNone/>
-            </a:pPr>
-            <a:r>
-              <a:rPr lang="en-US" sz="3000" dirty="0" smtClean="0"/>
-              <a:t>A </a:t>
-            </a:r>
-            <a:r>
-              <a:rPr lang="en-US" sz="3000" dirty="0"/>
-              <a:t>topic defines a how a bot conversation plays out.</a:t>
-            </a:r>
-          </a:p>
-          <a:p>
-            <a:pPr marL="0" indent="0">
-              <a:buNone/>
-            </a:pPr>
-            <a:r>
-              <a:rPr lang="en-US" sz="3000" dirty="0" smtClean="0"/>
-              <a:t>Topic components:</a:t>
-            </a:r>
-          </a:p>
-          <a:p>
-            <a:r>
-              <a:rPr lang="en-US" sz="3000" dirty="0" smtClean="0"/>
-              <a:t>Trigger phrases</a:t>
-            </a:r>
-            <a:endParaRPr lang="en-US" sz="3000" dirty="0"/>
-          </a:p>
-          <a:p>
-            <a:r>
-              <a:rPr lang="en-US" sz="3000" dirty="0" smtClean="0"/>
-              <a:t>Conversation </a:t>
-            </a:r>
-            <a:r>
-              <a:rPr lang="en-US" sz="3000" dirty="0"/>
-              <a:t>nodes.</a:t>
-            </a:r>
-          </a:p>
-          <a:p>
-            <a:pPr marL="0" indent="0">
-              <a:buNone/>
-            </a:pPr>
-            <a:endParaRPr lang="en-US" sz="3000" dirty="0" smtClean="0"/>
-          </a:p>
-          <a:p>
-            <a:pPr marL="0" indent="0">
-              <a:buNone/>
-            </a:pPr>
-            <a:r>
-              <a:rPr lang="en-US" sz="3000" dirty="0" smtClean="0"/>
-              <a:t>Topic takes Phrases/Keywords as Input and shows the relevant output defined by business.</a:t>
-            </a:r>
-          </a:p>
-          <a:p>
-            <a:pPr marL="0" indent="0">
-              <a:buNone/>
-            </a:pPr>
-            <a:endParaRPr lang="en-US" sz="3000" dirty="0"/>
-          </a:p>
-          <a:p>
-            <a:pPr marL="0" indent="0">
-              <a:buNone/>
-            </a:pPr>
-            <a:r>
-              <a:rPr lang="en-US" sz="3000" dirty="0" smtClean="0"/>
-              <a:t>For </a:t>
-            </a:r>
-            <a:r>
-              <a:rPr lang="en-US" sz="3000" dirty="0" err="1" smtClean="0"/>
-              <a:t>eg</a:t>
-            </a:r>
-            <a:r>
-              <a:rPr lang="en-US" sz="3000" dirty="0" smtClean="0"/>
-              <a:t>.,</a:t>
-            </a:r>
-            <a:r>
-              <a:rPr lang="en-US" sz="3000" dirty="0"/>
-              <a:t> </a:t>
-            </a:r>
-            <a:r>
-              <a:rPr lang="en-US" sz="3000" dirty="0" smtClean="0"/>
-              <a:t>Topic: Insurance Filing docs, requires phrases such as “prerequisite documents” that user in general give in chat, the bot will understand these phrases and will generate the business output that satisfies the user </a:t>
-            </a:r>
-            <a:r>
-              <a:rPr lang="en-US" sz="3000" dirty="0" err="1" smtClean="0"/>
-              <a:t>ie</a:t>
-            </a:r>
-            <a:r>
-              <a:rPr lang="en-US" sz="3000" dirty="0" smtClean="0"/>
-              <a:t>., List of proof documents in this case.</a:t>
-            </a:r>
-            <a:endParaRPr lang="en-US" sz="3200" dirty="0"/>
-          </a:p>
-          <a:p>
-            <a:pPr marL="0" indent="0">
-              <a:buNone/>
-            </a:pPr>
-            <a:r>
-              <a:rPr lang="en-US" dirty="0" smtClean="0"/>
-              <a:t>	</a:t>
-            </a:r>
-            <a:endParaRPr lang="en-US" dirty="0"/>
-          </a:p>
-        </p:txBody>
-      </p:sp>
-    </p:spTree>
-    <p:extLst>
-      <p:ext uri="{BB962C8B-B14F-4D97-AF65-F5344CB8AC3E}">
-        <p14:creationId xmlns:p14="http://schemas.microsoft.com/office/powerpoint/2010/main" val="3127813953"/>
       </p:ext>
     </p:extLst>
   </p:cSld>

</xml_diff>